<commit_message>
[Edit] Building Kubernetes from source instructions
</commit_message>
<xml_diff>
--- a/docs/Building Kubernetes From Source.pptx
+++ b/docs/Building Kubernetes From Source.pptx
@@ -8,10 +8,21 @@
     <p:sldId id="259" r:id="rId2"/>
     <p:sldId id="257" r:id="rId3"/>
     <p:sldId id="258" r:id="rId4"/>
-    <p:sldId id="262" r:id="rId5"/>
-    <p:sldId id="261" r:id="rId6"/>
-    <p:sldId id="264" r:id="rId7"/>
-    <p:sldId id="263" r:id="rId8"/>
+    <p:sldId id="261" r:id="rId5"/>
+    <p:sldId id="276" r:id="rId6"/>
+    <p:sldId id="277" r:id="rId7"/>
+    <p:sldId id="278" r:id="rId8"/>
+    <p:sldId id="279" r:id="rId9"/>
+    <p:sldId id="262" r:id="rId10"/>
+    <p:sldId id="280" r:id="rId11"/>
+    <p:sldId id="281" r:id="rId12"/>
+    <p:sldId id="282" r:id="rId13"/>
+    <p:sldId id="283" r:id="rId14"/>
+    <p:sldId id="267" r:id="rId15"/>
+    <p:sldId id="266" r:id="rId16"/>
+    <p:sldId id="270" r:id="rId17"/>
+    <p:sldId id="274" r:id="rId18"/>
+    <p:sldId id="268" r:id="rId19"/>
   </p:sldIdLst>
   <p:sldSz cx="12192000" cy="6858000"/>
   <p:notesSz cx="6858000" cy="9144000"/>
@@ -355,7 +366,7 @@
           <a:p>
             <a:fld id="{FD9F2422-CF6A-4527-A447-E7438BC7F305}" type="datetimeFigureOut">
               <a:rPr lang="ko-KR" altLang="en-US" smtClean="0"/>
-              <a:t>2020. 4. 21.</a:t>
+              <a:t>2020. 4. 28.</a:t>
             </a:fld>
             <a:endParaRPr lang="ko-KR" altLang="en-US"/>
           </a:p>
@@ -563,7 +574,7 @@
           <a:p>
             <a:fld id="{FD9F2422-CF6A-4527-A447-E7438BC7F305}" type="datetimeFigureOut">
               <a:rPr lang="ko-KR" altLang="en-US" smtClean="0"/>
-              <a:t>2020. 4. 21.</a:t>
+              <a:t>2020. 4. 28.</a:t>
             </a:fld>
             <a:endParaRPr lang="ko-KR" altLang="en-US"/>
           </a:p>
@@ -819,7 +830,7 @@
           <a:p>
             <a:fld id="{FD9F2422-CF6A-4527-A447-E7438BC7F305}" type="datetimeFigureOut">
               <a:rPr lang="ko-KR" altLang="en-US" smtClean="0"/>
-              <a:t>2020. 4. 21.</a:t>
+              <a:t>2020. 4. 28.</a:t>
             </a:fld>
             <a:endParaRPr lang="ko-KR" altLang="en-US"/>
           </a:p>
@@ -993,7 +1004,7 @@
           <a:p>
             <a:fld id="{FD9F2422-CF6A-4527-A447-E7438BC7F305}" type="datetimeFigureOut">
               <a:rPr lang="ko-KR" altLang="en-US" smtClean="0"/>
-              <a:t>2020. 4. 21.</a:t>
+              <a:t>2020. 4. 28.</a:t>
             </a:fld>
             <a:endParaRPr lang="ko-KR" altLang="en-US"/>
           </a:p>
@@ -1336,7 +1347,7 @@
           <a:p>
             <a:fld id="{FD9F2422-CF6A-4527-A447-E7438BC7F305}" type="datetimeFigureOut">
               <a:rPr lang="ko-KR" altLang="en-US" smtClean="0"/>
-              <a:t>2020. 4. 21.</a:t>
+              <a:t>2020. 4. 28.</a:t>
             </a:fld>
             <a:endParaRPr lang="ko-KR" altLang="en-US"/>
           </a:p>
@@ -1611,7 +1622,7 @@
           <a:p>
             <a:fld id="{FD9F2422-CF6A-4527-A447-E7438BC7F305}" type="datetimeFigureOut">
               <a:rPr lang="ko-KR" altLang="en-US" smtClean="0"/>
-              <a:t>2020. 4. 21.</a:t>
+              <a:t>2020. 4. 28.</a:t>
             </a:fld>
             <a:endParaRPr lang="ko-KR" altLang="en-US"/>
           </a:p>
@@ -1990,7 +2001,7 @@
           <a:p>
             <a:fld id="{FD9F2422-CF6A-4527-A447-E7438BC7F305}" type="datetimeFigureOut">
               <a:rPr lang="ko-KR" altLang="en-US" smtClean="0"/>
-              <a:t>2020. 4. 21.</a:t>
+              <a:t>2020. 4. 28.</a:t>
             </a:fld>
             <a:endParaRPr lang="ko-KR" altLang="en-US"/>
           </a:p>
@@ -2108,7 +2119,7 @@
           <a:p>
             <a:fld id="{FD9F2422-CF6A-4527-A447-E7438BC7F305}" type="datetimeFigureOut">
               <a:rPr lang="ko-KR" altLang="en-US" smtClean="0"/>
-              <a:t>2020. 4. 21.</a:t>
+              <a:t>2020. 4. 28.</a:t>
             </a:fld>
             <a:endParaRPr lang="ko-KR" altLang="en-US"/>
           </a:p>
@@ -2279,7 +2290,7 @@
           <a:p>
             <a:fld id="{FD9F2422-CF6A-4527-A447-E7438BC7F305}" type="datetimeFigureOut">
               <a:rPr lang="ko-KR" altLang="en-US" smtClean="0"/>
-              <a:t>2020. 4. 21.</a:t>
+              <a:t>2020. 4. 28.</a:t>
             </a:fld>
             <a:endParaRPr lang="ko-KR" altLang="en-US"/>
           </a:p>
@@ -2633,7 +2644,7 @@
           <a:p>
             <a:fld id="{FD9F2422-CF6A-4527-A447-E7438BC7F305}" type="datetimeFigureOut">
               <a:rPr lang="ko-KR" altLang="en-US" smtClean="0"/>
-              <a:t>2020. 4. 21.</a:t>
+              <a:t>2020. 4. 28.</a:t>
             </a:fld>
             <a:endParaRPr lang="ko-KR" altLang="en-US"/>
           </a:p>
@@ -3015,7 +3026,7 @@
           <a:p>
             <a:fld id="{FD9F2422-CF6A-4527-A447-E7438BC7F305}" type="datetimeFigureOut">
               <a:rPr lang="ko-KR" altLang="en-US" smtClean="0"/>
-              <a:t>2020. 4. 21.</a:t>
+              <a:t>2020. 4. 28.</a:t>
             </a:fld>
             <a:endParaRPr lang="ko-KR" altLang="en-US"/>
           </a:p>
@@ -3302,7 +3313,7 @@
           <a:p>
             <a:fld id="{FD9F2422-CF6A-4527-A447-E7438BC7F305}" type="datetimeFigureOut">
               <a:rPr lang="ko-KR" altLang="en-US" smtClean="0"/>
-              <a:t>2020. 4. 21.</a:t>
+              <a:t>2020. 4. 28.</a:t>
             </a:fld>
             <a:endParaRPr lang="ko-KR" altLang="en-US"/>
           </a:p>
@@ -3895,6 +3906,2351 @@
 </p:sld>
 </file>
 
+<file path=ppt/slides/slide10.xml><?xml version="1.0" encoding="utf-8"?>
+<p:sld xmlns:a="http://schemas.openxmlformats.org/drawingml/2006/main" xmlns:r="http://schemas.openxmlformats.org/officeDocument/2006/relationships" xmlns:p="http://schemas.openxmlformats.org/presentationml/2006/main">
+  <p:cSld>
+    <p:spTree>
+      <p:nvGrpSpPr>
+        <p:cNvPr id="1" name=""/>
+        <p:cNvGrpSpPr/>
+        <p:nvPr/>
+      </p:nvGrpSpPr>
+      <p:grpSpPr>
+        <a:xfrm>
+          <a:off x="0" y="0"/>
+          <a:ext cx="0" cy="0"/>
+          <a:chOff x="0" y="0"/>
+          <a:chExt cx="0" cy="0"/>
+        </a:xfrm>
+      </p:grpSpPr>
+      <p:sp>
+        <p:nvSpPr>
+          <p:cNvPr id="2" name="제목 1">
+            <a:extLst>
+              <a:ext uri="{FF2B5EF4-FFF2-40B4-BE49-F238E27FC236}">
+                <a16:creationId xmlns:a16="http://schemas.microsoft.com/office/drawing/2014/main" id="{7B784487-77DC-4D81-92E2-91E64A538BEC}"/>
+              </a:ext>
+            </a:extLst>
+          </p:cNvPr>
+          <p:cNvSpPr>
+            <a:spLocks noGrp="1"/>
+          </p:cNvSpPr>
+          <p:nvPr>
+            <p:ph type="title"/>
+          </p:nvPr>
+        </p:nvSpPr>
+        <p:spPr/>
+        <p:txBody>
+          <a:bodyPr/>
+          <a:lstStyle/>
+          <a:p>
+            <a:r>
+              <a:rPr lang="en-US" altLang="ko-KR" dirty="0"/>
+              <a:t>Install K8s - 3</a:t>
+            </a:r>
+            <a:endParaRPr lang="ko-KR" altLang="en-US" dirty="0"/>
+          </a:p>
+        </p:txBody>
+      </p:sp>
+      <p:sp>
+        <p:nvSpPr>
+          <p:cNvPr id="3" name="내용 개체 틀 2">
+            <a:extLst>
+              <a:ext uri="{FF2B5EF4-FFF2-40B4-BE49-F238E27FC236}">
+                <a16:creationId xmlns:a16="http://schemas.microsoft.com/office/drawing/2014/main" id="{68B6CABF-44E6-45BA-9FCD-7A2412C0EF20}"/>
+              </a:ext>
+            </a:extLst>
+          </p:cNvPr>
+          <p:cNvSpPr>
+            <a:spLocks noGrp="1"/>
+          </p:cNvSpPr>
+          <p:nvPr>
+            <p:ph idx="1"/>
+          </p:nvPr>
+        </p:nvSpPr>
+        <p:spPr>
+          <a:xfrm>
+            <a:off x="1066800" y="2104289"/>
+            <a:ext cx="10058400" cy="4023360"/>
+          </a:xfrm>
+        </p:spPr>
+        <p:txBody>
+          <a:bodyPr>
+            <a:normAutofit lnSpcReduction="10000"/>
+          </a:bodyPr>
+          <a:lstStyle/>
+          <a:p>
+            <a:pPr>
+              <a:lnSpc>
+                <a:spcPct val="120000"/>
+              </a:lnSpc>
+            </a:pPr>
+            <a:r>
+              <a:rPr lang="en-US" altLang="ko-KR" sz="3200" dirty="0"/>
+              <a:t>- Initialize Kubernetes on master node</a:t>
+            </a:r>
+          </a:p>
+          <a:p>
+            <a:pPr>
+              <a:lnSpc>
+                <a:spcPct val="120000"/>
+              </a:lnSpc>
+            </a:pPr>
+            <a:r>
+              <a:rPr lang="en-US" altLang="ko-KR" sz="3200" dirty="0">
+                <a:latin typeface="Consolas" panose="020B0609020204030204" pitchFamily="49" charset="0"/>
+                <a:cs typeface="Consolas" panose="020B0609020204030204" pitchFamily="49" charset="0"/>
+              </a:rPr>
+              <a:t> </a:t>
+            </a:r>
+            <a:r>
+              <a:rPr lang="en-US" altLang="ko-Kore-KR" dirty="0" err="1">
+                <a:latin typeface="Consolas" panose="020B0609020204030204" pitchFamily="49" charset="0"/>
+                <a:cs typeface="Consolas" panose="020B0609020204030204" pitchFamily="49" charset="0"/>
+              </a:rPr>
+              <a:t>sudo</a:t>
+            </a:r>
+            <a:r>
+              <a:rPr lang="en-US" altLang="ko-Kore-KR" dirty="0">
+                <a:latin typeface="Consolas" panose="020B0609020204030204" pitchFamily="49" charset="0"/>
+                <a:cs typeface="Consolas" panose="020B0609020204030204" pitchFamily="49" charset="0"/>
+              </a:rPr>
+              <a:t> </a:t>
+            </a:r>
+            <a:r>
+              <a:rPr lang="en-US" altLang="ko-Kore-KR" dirty="0" err="1">
+                <a:latin typeface="Consolas" panose="020B0609020204030204" pitchFamily="49" charset="0"/>
+                <a:cs typeface="Consolas" panose="020B0609020204030204" pitchFamily="49" charset="0"/>
+              </a:rPr>
+              <a:t>kubeadm</a:t>
+            </a:r>
+            <a:r>
+              <a:rPr lang="en-US" altLang="ko-Kore-KR" dirty="0">
+                <a:latin typeface="Consolas" panose="020B0609020204030204" pitchFamily="49" charset="0"/>
+                <a:cs typeface="Consolas" panose="020B0609020204030204" pitchFamily="49" charset="0"/>
+              </a:rPr>
+              <a:t> </a:t>
+            </a:r>
+            <a:r>
+              <a:rPr lang="en-US" altLang="ko-Kore-KR" dirty="0" err="1">
+                <a:latin typeface="Consolas" panose="020B0609020204030204" pitchFamily="49" charset="0"/>
+                <a:cs typeface="Consolas" panose="020B0609020204030204" pitchFamily="49" charset="0"/>
+              </a:rPr>
+              <a:t>init</a:t>
+            </a:r>
+            <a:r>
+              <a:rPr lang="en-US" altLang="ko-Kore-KR" dirty="0">
+                <a:latin typeface="Consolas" panose="020B0609020204030204" pitchFamily="49" charset="0"/>
+                <a:cs typeface="Consolas" panose="020B0609020204030204" pitchFamily="49" charset="0"/>
+              </a:rPr>
+              <a:t> --pod-network-</a:t>
+            </a:r>
+            <a:r>
+              <a:rPr lang="en-US" altLang="ko-Kore-KR" dirty="0" err="1">
+                <a:latin typeface="Consolas" panose="020B0609020204030204" pitchFamily="49" charset="0"/>
+                <a:cs typeface="Consolas" panose="020B0609020204030204" pitchFamily="49" charset="0"/>
+              </a:rPr>
+              <a:t>cidr</a:t>
+            </a:r>
+            <a:r>
+              <a:rPr lang="en-US" altLang="ko-Kore-KR" dirty="0">
+                <a:latin typeface="Consolas" panose="020B0609020204030204" pitchFamily="49" charset="0"/>
+                <a:cs typeface="Consolas" panose="020B0609020204030204" pitchFamily="49" charset="0"/>
+              </a:rPr>
+              <a:t>=10.244.0.0/16</a:t>
+            </a:r>
+            <a:endParaRPr lang="en-US" altLang="ko-KR" dirty="0">
+              <a:latin typeface="Consolas" panose="020B0609020204030204" pitchFamily="49" charset="0"/>
+              <a:cs typeface="Consolas" panose="020B0609020204030204" pitchFamily="49" charset="0"/>
+            </a:endParaRPr>
+          </a:p>
+          <a:p>
+            <a:pPr>
+              <a:lnSpc>
+                <a:spcPct val="150000"/>
+              </a:lnSpc>
+            </a:pPr>
+            <a:r>
+              <a:rPr lang="en-US" altLang="ko-KR" sz="3200" dirty="0"/>
+              <a:t>- Apply config on master node</a:t>
+            </a:r>
+          </a:p>
+          <a:p>
+            <a:pPr>
+              <a:lnSpc>
+                <a:spcPct val="150000"/>
+              </a:lnSpc>
+            </a:pPr>
+            <a:r>
+              <a:rPr lang="en-US" altLang="ko-Kore-KR" dirty="0">
+                <a:latin typeface="Consolas" panose="020B0609020204030204" pitchFamily="49" charset="0"/>
+                <a:cs typeface="Consolas" panose="020B0609020204030204" pitchFamily="49" charset="0"/>
+              </a:rPr>
+              <a:t>  </a:t>
+            </a:r>
+            <a:r>
+              <a:rPr lang="en-US" altLang="ko-Kore-KR" dirty="0" err="1">
+                <a:latin typeface="Consolas" panose="020B0609020204030204" pitchFamily="49" charset="0"/>
+                <a:cs typeface="Consolas" panose="020B0609020204030204" pitchFamily="49" charset="0"/>
+              </a:rPr>
+              <a:t>mkdir</a:t>
+            </a:r>
+            <a:r>
+              <a:rPr lang="en-US" altLang="ko-Kore-KR" dirty="0">
+                <a:latin typeface="Consolas" panose="020B0609020204030204" pitchFamily="49" charset="0"/>
+                <a:cs typeface="Consolas" panose="020B0609020204030204" pitchFamily="49" charset="0"/>
+              </a:rPr>
+              <a:t> -p $HOME/.</a:t>
+            </a:r>
+            <a:r>
+              <a:rPr lang="en-US" altLang="ko-Kore-KR" dirty="0" err="1">
+                <a:latin typeface="Consolas" panose="020B0609020204030204" pitchFamily="49" charset="0"/>
+                <a:cs typeface="Consolas" panose="020B0609020204030204" pitchFamily="49" charset="0"/>
+              </a:rPr>
+              <a:t>kube</a:t>
+            </a:r>
+            <a:endParaRPr lang="en-US" altLang="ko-Kore-KR" dirty="0">
+              <a:latin typeface="Consolas" panose="020B0609020204030204" pitchFamily="49" charset="0"/>
+              <a:cs typeface="Consolas" panose="020B0609020204030204" pitchFamily="49" charset="0"/>
+            </a:endParaRPr>
+          </a:p>
+          <a:p>
+            <a:pPr>
+              <a:lnSpc>
+                <a:spcPct val="150000"/>
+              </a:lnSpc>
+            </a:pPr>
+            <a:r>
+              <a:rPr lang="en-US" altLang="ko-Kore-KR" dirty="0">
+                <a:latin typeface="Consolas" panose="020B0609020204030204" pitchFamily="49" charset="0"/>
+                <a:cs typeface="Consolas" panose="020B0609020204030204" pitchFamily="49" charset="0"/>
+              </a:rPr>
+              <a:t>  </a:t>
+            </a:r>
+            <a:r>
+              <a:rPr lang="en-US" altLang="ko-Kore-KR" dirty="0" err="1">
+                <a:latin typeface="Consolas" panose="020B0609020204030204" pitchFamily="49" charset="0"/>
+                <a:cs typeface="Consolas" panose="020B0609020204030204" pitchFamily="49" charset="0"/>
+              </a:rPr>
+              <a:t>sudo</a:t>
+            </a:r>
+            <a:r>
+              <a:rPr lang="en-US" altLang="ko-Kore-KR" dirty="0">
+                <a:latin typeface="Consolas" panose="020B0609020204030204" pitchFamily="49" charset="0"/>
+                <a:cs typeface="Consolas" panose="020B0609020204030204" pitchFamily="49" charset="0"/>
+              </a:rPr>
+              <a:t> cp -</a:t>
+            </a:r>
+            <a:r>
+              <a:rPr lang="en-US" altLang="ko-Kore-KR" dirty="0" err="1">
+                <a:latin typeface="Consolas" panose="020B0609020204030204" pitchFamily="49" charset="0"/>
+                <a:cs typeface="Consolas" panose="020B0609020204030204" pitchFamily="49" charset="0"/>
+              </a:rPr>
+              <a:t>i</a:t>
+            </a:r>
+            <a:r>
+              <a:rPr lang="en-US" altLang="ko-Kore-KR" dirty="0">
+                <a:latin typeface="Consolas" panose="020B0609020204030204" pitchFamily="49" charset="0"/>
+                <a:cs typeface="Consolas" panose="020B0609020204030204" pitchFamily="49" charset="0"/>
+              </a:rPr>
+              <a:t> /</a:t>
+            </a:r>
+            <a:r>
+              <a:rPr lang="en-US" altLang="ko-Kore-KR" dirty="0" err="1">
+                <a:latin typeface="Consolas" panose="020B0609020204030204" pitchFamily="49" charset="0"/>
+                <a:cs typeface="Consolas" panose="020B0609020204030204" pitchFamily="49" charset="0"/>
+              </a:rPr>
+              <a:t>etc</a:t>
+            </a:r>
+            <a:r>
+              <a:rPr lang="en-US" altLang="ko-Kore-KR" dirty="0">
+                <a:latin typeface="Consolas" panose="020B0609020204030204" pitchFamily="49" charset="0"/>
+                <a:cs typeface="Consolas" panose="020B0609020204030204" pitchFamily="49" charset="0"/>
+              </a:rPr>
+              <a:t>/</a:t>
+            </a:r>
+            <a:r>
+              <a:rPr lang="en-US" altLang="ko-Kore-KR" dirty="0" err="1">
+                <a:latin typeface="Consolas" panose="020B0609020204030204" pitchFamily="49" charset="0"/>
+                <a:cs typeface="Consolas" panose="020B0609020204030204" pitchFamily="49" charset="0"/>
+              </a:rPr>
+              <a:t>kubernetes</a:t>
+            </a:r>
+            <a:r>
+              <a:rPr lang="en-US" altLang="ko-Kore-KR" dirty="0">
+                <a:latin typeface="Consolas" panose="020B0609020204030204" pitchFamily="49" charset="0"/>
+                <a:cs typeface="Consolas" panose="020B0609020204030204" pitchFamily="49" charset="0"/>
+              </a:rPr>
+              <a:t>/</a:t>
+            </a:r>
+            <a:r>
+              <a:rPr lang="en-US" altLang="ko-Kore-KR" dirty="0" err="1">
+                <a:latin typeface="Consolas" panose="020B0609020204030204" pitchFamily="49" charset="0"/>
+                <a:cs typeface="Consolas" panose="020B0609020204030204" pitchFamily="49" charset="0"/>
+              </a:rPr>
+              <a:t>admin.conf</a:t>
+            </a:r>
+            <a:r>
+              <a:rPr lang="en-US" altLang="ko-Kore-KR" dirty="0">
+                <a:latin typeface="Consolas" panose="020B0609020204030204" pitchFamily="49" charset="0"/>
+                <a:cs typeface="Consolas" panose="020B0609020204030204" pitchFamily="49" charset="0"/>
+              </a:rPr>
+              <a:t> $HOME/.</a:t>
+            </a:r>
+            <a:r>
+              <a:rPr lang="en-US" altLang="ko-Kore-KR" dirty="0" err="1">
+                <a:latin typeface="Consolas" panose="020B0609020204030204" pitchFamily="49" charset="0"/>
+                <a:cs typeface="Consolas" panose="020B0609020204030204" pitchFamily="49" charset="0"/>
+              </a:rPr>
+              <a:t>kube</a:t>
+            </a:r>
+            <a:r>
+              <a:rPr lang="en-US" altLang="ko-Kore-KR" dirty="0">
+                <a:latin typeface="Consolas" panose="020B0609020204030204" pitchFamily="49" charset="0"/>
+                <a:cs typeface="Consolas" panose="020B0609020204030204" pitchFamily="49" charset="0"/>
+              </a:rPr>
+              <a:t>/config</a:t>
+            </a:r>
+          </a:p>
+          <a:p>
+            <a:pPr>
+              <a:lnSpc>
+                <a:spcPct val="150000"/>
+              </a:lnSpc>
+            </a:pPr>
+            <a:r>
+              <a:rPr lang="en-US" altLang="ko-Kore-KR" dirty="0">
+                <a:latin typeface="Consolas" panose="020B0609020204030204" pitchFamily="49" charset="0"/>
+                <a:cs typeface="Consolas" panose="020B0609020204030204" pitchFamily="49" charset="0"/>
+              </a:rPr>
+              <a:t>  </a:t>
+            </a:r>
+            <a:r>
+              <a:rPr lang="en-US" altLang="ko-Kore-KR" dirty="0" err="1">
+                <a:latin typeface="Consolas" panose="020B0609020204030204" pitchFamily="49" charset="0"/>
+                <a:cs typeface="Consolas" panose="020B0609020204030204" pitchFamily="49" charset="0"/>
+              </a:rPr>
+              <a:t>sudo</a:t>
+            </a:r>
+            <a:r>
+              <a:rPr lang="en-US" altLang="ko-Kore-KR" dirty="0">
+                <a:latin typeface="Consolas" panose="020B0609020204030204" pitchFamily="49" charset="0"/>
+                <a:cs typeface="Consolas" panose="020B0609020204030204" pitchFamily="49" charset="0"/>
+              </a:rPr>
+              <a:t> </a:t>
+            </a:r>
+            <a:r>
+              <a:rPr lang="en-US" altLang="ko-Kore-KR" dirty="0" err="1">
+                <a:latin typeface="Consolas" panose="020B0609020204030204" pitchFamily="49" charset="0"/>
+                <a:cs typeface="Consolas" panose="020B0609020204030204" pitchFamily="49" charset="0"/>
+              </a:rPr>
+              <a:t>chown</a:t>
+            </a:r>
+            <a:r>
+              <a:rPr lang="en-US" altLang="ko-Kore-KR" dirty="0">
+                <a:latin typeface="Consolas" panose="020B0609020204030204" pitchFamily="49" charset="0"/>
+                <a:cs typeface="Consolas" panose="020B0609020204030204" pitchFamily="49" charset="0"/>
+              </a:rPr>
+              <a:t> $(id -u):$(id -g) $HOME/.</a:t>
+            </a:r>
+            <a:r>
+              <a:rPr lang="en-US" altLang="ko-Kore-KR" dirty="0" err="1">
+                <a:latin typeface="Consolas" panose="020B0609020204030204" pitchFamily="49" charset="0"/>
+                <a:cs typeface="Consolas" panose="020B0609020204030204" pitchFamily="49" charset="0"/>
+              </a:rPr>
+              <a:t>kube</a:t>
+            </a:r>
+            <a:r>
+              <a:rPr lang="en-US" altLang="ko-Kore-KR" dirty="0">
+                <a:latin typeface="Consolas" panose="020B0609020204030204" pitchFamily="49" charset="0"/>
+                <a:cs typeface="Consolas" panose="020B0609020204030204" pitchFamily="49" charset="0"/>
+              </a:rPr>
+              <a:t>/config</a:t>
+            </a:r>
+            <a:endParaRPr lang="en-US" altLang="ko-KR" b="1" dirty="0">
+              <a:latin typeface="Consolas" panose="020B0609020204030204" pitchFamily="49" charset="0"/>
+              <a:cs typeface="Consolas" panose="020B0609020204030204" pitchFamily="49" charset="0"/>
+            </a:endParaRPr>
+          </a:p>
+        </p:txBody>
+      </p:sp>
+    </p:spTree>
+    <p:extLst>
+      <p:ext uri="{BB962C8B-B14F-4D97-AF65-F5344CB8AC3E}">
+        <p14:creationId xmlns:p14="http://schemas.microsoft.com/office/powerpoint/2010/main" val="2772524777"/>
+      </p:ext>
+    </p:extLst>
+  </p:cSld>
+  <p:clrMapOvr>
+    <a:masterClrMapping/>
+  </p:clrMapOvr>
+</p:sld>
+</file>
+
+<file path=ppt/slides/slide11.xml><?xml version="1.0" encoding="utf-8"?>
+<p:sld xmlns:a="http://schemas.openxmlformats.org/drawingml/2006/main" xmlns:r="http://schemas.openxmlformats.org/officeDocument/2006/relationships" xmlns:p="http://schemas.openxmlformats.org/presentationml/2006/main">
+  <p:cSld>
+    <p:spTree>
+      <p:nvGrpSpPr>
+        <p:cNvPr id="1" name=""/>
+        <p:cNvGrpSpPr/>
+        <p:nvPr/>
+      </p:nvGrpSpPr>
+      <p:grpSpPr>
+        <a:xfrm>
+          <a:off x="0" y="0"/>
+          <a:ext cx="0" cy="0"/>
+          <a:chOff x="0" y="0"/>
+          <a:chExt cx="0" cy="0"/>
+        </a:xfrm>
+      </p:grpSpPr>
+      <p:sp>
+        <p:nvSpPr>
+          <p:cNvPr id="2" name="제목 1">
+            <a:extLst>
+              <a:ext uri="{FF2B5EF4-FFF2-40B4-BE49-F238E27FC236}">
+                <a16:creationId xmlns:a16="http://schemas.microsoft.com/office/drawing/2014/main" id="{7B784487-77DC-4D81-92E2-91E64A538BEC}"/>
+              </a:ext>
+            </a:extLst>
+          </p:cNvPr>
+          <p:cNvSpPr>
+            <a:spLocks noGrp="1"/>
+          </p:cNvSpPr>
+          <p:nvPr>
+            <p:ph type="title"/>
+          </p:nvPr>
+        </p:nvSpPr>
+        <p:spPr/>
+        <p:txBody>
+          <a:bodyPr/>
+          <a:lstStyle/>
+          <a:p>
+            <a:r>
+              <a:rPr lang="en-US" altLang="ko-KR" dirty="0"/>
+              <a:t>Install K8s - 4</a:t>
+            </a:r>
+            <a:endParaRPr lang="ko-KR" altLang="en-US" dirty="0"/>
+          </a:p>
+        </p:txBody>
+      </p:sp>
+      <p:sp>
+        <p:nvSpPr>
+          <p:cNvPr id="3" name="내용 개체 틀 2">
+            <a:extLst>
+              <a:ext uri="{FF2B5EF4-FFF2-40B4-BE49-F238E27FC236}">
+                <a16:creationId xmlns:a16="http://schemas.microsoft.com/office/drawing/2014/main" id="{68B6CABF-44E6-45BA-9FCD-7A2412C0EF20}"/>
+              </a:ext>
+            </a:extLst>
+          </p:cNvPr>
+          <p:cNvSpPr>
+            <a:spLocks noGrp="1"/>
+          </p:cNvSpPr>
+          <p:nvPr>
+            <p:ph idx="1"/>
+          </p:nvPr>
+        </p:nvSpPr>
+        <p:spPr>
+          <a:xfrm>
+            <a:off x="1066800" y="2104289"/>
+            <a:ext cx="10058400" cy="4023360"/>
+          </a:xfrm>
+        </p:spPr>
+        <p:txBody>
+          <a:bodyPr>
+            <a:normAutofit/>
+          </a:bodyPr>
+          <a:lstStyle/>
+          <a:p>
+            <a:pPr>
+              <a:lnSpc>
+                <a:spcPct val="120000"/>
+              </a:lnSpc>
+            </a:pPr>
+            <a:r>
+              <a:rPr lang="en-US" altLang="ko-KR" sz="3200" dirty="0"/>
+              <a:t>- Join the master node on slave node</a:t>
+            </a:r>
+          </a:p>
+          <a:p>
+            <a:pPr>
+              <a:lnSpc>
+                <a:spcPct val="120000"/>
+              </a:lnSpc>
+            </a:pPr>
+            <a:r>
+              <a:rPr lang="en-US" altLang="ko-KR" sz="3200" dirty="0">
+                <a:latin typeface="Consolas" panose="020B0609020204030204" pitchFamily="49" charset="0"/>
+                <a:cs typeface="Consolas" panose="020B0609020204030204" pitchFamily="49" charset="0"/>
+              </a:rPr>
+              <a:t> </a:t>
+            </a:r>
+            <a:endParaRPr lang="en-US" altLang="ko-KR" b="1" dirty="0">
+              <a:latin typeface="Consolas" panose="020B0609020204030204" pitchFamily="49" charset="0"/>
+              <a:cs typeface="Consolas" panose="020B0609020204030204" pitchFamily="49" charset="0"/>
+            </a:endParaRPr>
+          </a:p>
+        </p:txBody>
+      </p:sp>
+      <p:pic>
+        <p:nvPicPr>
+          <p:cNvPr id="5" name="그림 4">
+            <a:extLst>
+              <a:ext uri="{FF2B5EF4-FFF2-40B4-BE49-F238E27FC236}">
+                <a16:creationId xmlns:a16="http://schemas.microsoft.com/office/drawing/2014/main" id="{4C8BF225-CD7A-2A4F-B665-13F494C767AC}"/>
+              </a:ext>
+            </a:extLst>
+          </p:cNvPr>
+          <p:cNvPicPr>
+            <a:picLocks noChangeAspect="1"/>
+          </p:cNvPicPr>
+          <p:nvPr/>
+        </p:nvPicPr>
+        <p:blipFill>
+          <a:blip r:embed="rId2"/>
+          <a:stretch>
+            <a:fillRect/>
+          </a:stretch>
+        </p:blipFill>
+        <p:spPr>
+          <a:xfrm>
+            <a:off x="1880167" y="3429000"/>
+            <a:ext cx="8431666" cy="1406734"/>
+          </a:xfrm>
+          <a:prstGeom prst="rect">
+            <a:avLst/>
+          </a:prstGeom>
+        </p:spPr>
+      </p:pic>
+      <p:sp>
+        <p:nvSpPr>
+          <p:cNvPr id="6" name="직사각형 5">
+            <a:extLst>
+              <a:ext uri="{FF2B5EF4-FFF2-40B4-BE49-F238E27FC236}">
+                <a16:creationId xmlns:a16="http://schemas.microsoft.com/office/drawing/2014/main" id="{C9015765-3CBA-8F4A-9286-7394A7F23815}"/>
+              </a:ext>
+            </a:extLst>
+          </p:cNvPr>
+          <p:cNvSpPr/>
+          <p:nvPr/>
+        </p:nvSpPr>
+        <p:spPr>
+          <a:xfrm>
+            <a:off x="1880167" y="4345413"/>
+            <a:ext cx="8431666" cy="490321"/>
+          </a:xfrm>
+          <a:prstGeom prst="rect">
+            <a:avLst/>
+          </a:prstGeom>
+          <a:noFill/>
+          <a:ln w="38100">
+            <a:solidFill>
+              <a:srgbClr val="FF0000"/>
+            </a:solidFill>
+          </a:ln>
+        </p:spPr>
+        <p:style>
+          <a:lnRef idx="2">
+            <a:schemeClr val="accent1">
+              <a:shade val="50000"/>
+            </a:schemeClr>
+          </a:lnRef>
+          <a:fillRef idx="1">
+            <a:schemeClr val="accent1"/>
+          </a:fillRef>
+          <a:effectRef idx="0">
+            <a:schemeClr val="accent1"/>
+          </a:effectRef>
+          <a:fontRef idx="minor">
+            <a:schemeClr val="lt1"/>
+          </a:fontRef>
+        </p:style>
+        <p:txBody>
+          <a:bodyPr rtlCol="0" anchor="ctr"/>
+          <a:lstStyle/>
+          <a:p>
+            <a:pPr algn="ctr"/>
+            <a:endParaRPr kumimoji="1" lang="ko-Kore-KR" altLang="en-US"/>
+          </a:p>
+        </p:txBody>
+      </p:sp>
+      <p:sp>
+        <p:nvSpPr>
+          <p:cNvPr id="7" name="TextBox 6">
+            <a:extLst>
+              <a:ext uri="{FF2B5EF4-FFF2-40B4-BE49-F238E27FC236}">
+                <a16:creationId xmlns:a16="http://schemas.microsoft.com/office/drawing/2014/main" id="{5D12BE3B-A3E9-EB4F-8818-E8558BA4F344}"/>
+              </a:ext>
+            </a:extLst>
+          </p:cNvPr>
+          <p:cNvSpPr txBox="1"/>
+          <p:nvPr/>
+        </p:nvSpPr>
+        <p:spPr>
+          <a:xfrm>
+            <a:off x="1880167" y="5297025"/>
+            <a:ext cx="2763085" cy="369332"/>
+          </a:xfrm>
+          <a:prstGeom prst="rect">
+            <a:avLst/>
+          </a:prstGeom>
+          <a:noFill/>
+        </p:spPr>
+        <p:txBody>
+          <a:bodyPr wrap="square" rtlCol="0">
+            <a:spAutoFit/>
+          </a:bodyPr>
+          <a:lstStyle/>
+          <a:p>
+            <a:r>
+              <a:rPr kumimoji="1" lang="en-US" altLang="ko-Kore-KR" dirty="0"/>
+              <a:t>Copy and run on slave node</a:t>
+            </a:r>
+            <a:endParaRPr kumimoji="1" lang="ko-Kore-KR" altLang="en-US" dirty="0"/>
+          </a:p>
+        </p:txBody>
+      </p:sp>
+      <p:cxnSp>
+        <p:nvCxnSpPr>
+          <p:cNvPr id="9" name="직선 화살표 연결선 8">
+            <a:extLst>
+              <a:ext uri="{FF2B5EF4-FFF2-40B4-BE49-F238E27FC236}">
+                <a16:creationId xmlns:a16="http://schemas.microsoft.com/office/drawing/2014/main" id="{2288C512-1CEE-DA4D-9F96-BD97F440B852}"/>
+              </a:ext>
+            </a:extLst>
+          </p:cNvPr>
+          <p:cNvCxnSpPr>
+            <a:cxnSpLocks/>
+          </p:cNvCxnSpPr>
+          <p:nvPr/>
+        </p:nvCxnSpPr>
+        <p:spPr>
+          <a:xfrm flipV="1">
+            <a:off x="3384468" y="4995127"/>
+            <a:ext cx="190005" cy="278788"/>
+          </a:xfrm>
+          <a:prstGeom prst="straightConnector1">
+            <a:avLst/>
+          </a:prstGeom>
+          <a:ln>
+            <a:tailEnd type="triangle"/>
+          </a:ln>
+        </p:spPr>
+        <p:style>
+          <a:lnRef idx="1">
+            <a:schemeClr val="accent1"/>
+          </a:lnRef>
+          <a:fillRef idx="0">
+            <a:schemeClr val="accent1"/>
+          </a:fillRef>
+          <a:effectRef idx="0">
+            <a:schemeClr val="accent1"/>
+          </a:effectRef>
+          <a:fontRef idx="minor">
+            <a:schemeClr val="tx1"/>
+          </a:fontRef>
+        </p:style>
+      </p:cxnSp>
+    </p:spTree>
+    <p:extLst>
+      <p:ext uri="{BB962C8B-B14F-4D97-AF65-F5344CB8AC3E}">
+        <p14:creationId xmlns:p14="http://schemas.microsoft.com/office/powerpoint/2010/main" val="3612768249"/>
+      </p:ext>
+    </p:extLst>
+  </p:cSld>
+  <p:clrMapOvr>
+    <a:masterClrMapping/>
+  </p:clrMapOvr>
+</p:sld>
+</file>
+
+<file path=ppt/slides/slide12.xml><?xml version="1.0" encoding="utf-8"?>
+<p:sld xmlns:a="http://schemas.openxmlformats.org/drawingml/2006/main" xmlns:r="http://schemas.openxmlformats.org/officeDocument/2006/relationships" xmlns:p="http://schemas.openxmlformats.org/presentationml/2006/main">
+  <p:cSld>
+    <p:spTree>
+      <p:nvGrpSpPr>
+        <p:cNvPr id="1" name=""/>
+        <p:cNvGrpSpPr/>
+        <p:nvPr/>
+      </p:nvGrpSpPr>
+      <p:grpSpPr>
+        <a:xfrm>
+          <a:off x="0" y="0"/>
+          <a:ext cx="0" cy="0"/>
+          <a:chOff x="0" y="0"/>
+          <a:chExt cx="0" cy="0"/>
+        </a:xfrm>
+      </p:grpSpPr>
+      <p:sp>
+        <p:nvSpPr>
+          <p:cNvPr id="2" name="제목 1">
+            <a:extLst>
+              <a:ext uri="{FF2B5EF4-FFF2-40B4-BE49-F238E27FC236}">
+                <a16:creationId xmlns:a16="http://schemas.microsoft.com/office/drawing/2014/main" id="{7B784487-77DC-4D81-92E2-91E64A538BEC}"/>
+              </a:ext>
+            </a:extLst>
+          </p:cNvPr>
+          <p:cNvSpPr>
+            <a:spLocks noGrp="1"/>
+          </p:cNvSpPr>
+          <p:nvPr>
+            <p:ph type="title"/>
+          </p:nvPr>
+        </p:nvSpPr>
+        <p:spPr/>
+        <p:txBody>
+          <a:bodyPr/>
+          <a:lstStyle/>
+          <a:p>
+            <a:r>
+              <a:rPr lang="en-US" altLang="ko-KR" dirty="0"/>
+              <a:t>Install K8s - 5</a:t>
+            </a:r>
+            <a:endParaRPr lang="ko-KR" altLang="en-US" dirty="0"/>
+          </a:p>
+        </p:txBody>
+      </p:sp>
+      <p:sp>
+        <p:nvSpPr>
+          <p:cNvPr id="3" name="내용 개체 틀 2">
+            <a:extLst>
+              <a:ext uri="{FF2B5EF4-FFF2-40B4-BE49-F238E27FC236}">
+                <a16:creationId xmlns:a16="http://schemas.microsoft.com/office/drawing/2014/main" id="{68B6CABF-44E6-45BA-9FCD-7A2412C0EF20}"/>
+              </a:ext>
+            </a:extLst>
+          </p:cNvPr>
+          <p:cNvSpPr>
+            <a:spLocks noGrp="1"/>
+          </p:cNvSpPr>
+          <p:nvPr>
+            <p:ph idx="1"/>
+          </p:nvPr>
+        </p:nvSpPr>
+        <p:spPr>
+          <a:xfrm>
+            <a:off x="1197429" y="2128040"/>
+            <a:ext cx="10058400" cy="4023360"/>
+          </a:xfrm>
+        </p:spPr>
+        <p:txBody>
+          <a:bodyPr>
+            <a:normAutofit/>
+          </a:bodyPr>
+          <a:lstStyle/>
+          <a:p>
+            <a:pPr marL="0" indent="0">
+              <a:lnSpc>
+                <a:spcPct val="120000"/>
+              </a:lnSpc>
+              <a:buNone/>
+            </a:pPr>
+            <a:r>
+              <a:rPr lang="en-US" altLang="ko-KR" dirty="0" err="1">
+                <a:latin typeface="Consolas" panose="020B0609020204030204" pitchFamily="49" charset="0"/>
+                <a:cs typeface="Consolas" panose="020B0609020204030204" pitchFamily="49" charset="0"/>
+              </a:rPr>
+              <a:t>kubectl</a:t>
+            </a:r>
+            <a:r>
+              <a:rPr lang="en-US" altLang="ko-KR" dirty="0">
+                <a:latin typeface="Consolas" panose="020B0609020204030204" pitchFamily="49" charset="0"/>
+                <a:cs typeface="Consolas" panose="020B0609020204030204" pitchFamily="49" charset="0"/>
+              </a:rPr>
+              <a:t> get nodes</a:t>
+            </a:r>
+          </a:p>
+          <a:p>
+            <a:pPr marL="0" indent="0">
+              <a:lnSpc>
+                <a:spcPct val="120000"/>
+              </a:lnSpc>
+              <a:buNone/>
+            </a:pPr>
+            <a:endParaRPr lang="en-US" altLang="ko-KR" sz="1400" dirty="0">
+              <a:latin typeface="Consolas" panose="020B0609020204030204" pitchFamily="49" charset="0"/>
+              <a:cs typeface="Consolas" panose="020B0609020204030204" pitchFamily="49" charset="0"/>
+            </a:endParaRPr>
+          </a:p>
+          <a:p>
+            <a:pPr marL="0" indent="0">
+              <a:lnSpc>
+                <a:spcPct val="120000"/>
+              </a:lnSpc>
+              <a:buNone/>
+            </a:pPr>
+            <a:endParaRPr lang="en-US" altLang="ko-KR" sz="1400" dirty="0">
+              <a:latin typeface="Consolas" panose="020B0609020204030204" pitchFamily="49" charset="0"/>
+              <a:cs typeface="Consolas" panose="020B0609020204030204" pitchFamily="49" charset="0"/>
+            </a:endParaRPr>
+          </a:p>
+        </p:txBody>
+      </p:sp>
+      <p:pic>
+        <p:nvPicPr>
+          <p:cNvPr id="4" name="그림 3">
+            <a:extLst>
+              <a:ext uri="{FF2B5EF4-FFF2-40B4-BE49-F238E27FC236}">
+                <a16:creationId xmlns:a16="http://schemas.microsoft.com/office/drawing/2014/main" id="{28AFFA0F-41CC-0B4B-99FC-0A0AD636F74F}"/>
+              </a:ext>
+            </a:extLst>
+          </p:cNvPr>
+          <p:cNvPicPr>
+            <a:picLocks noChangeAspect="1"/>
+          </p:cNvPicPr>
+          <p:nvPr/>
+        </p:nvPicPr>
+        <p:blipFill>
+          <a:blip r:embed="rId2"/>
+          <a:stretch>
+            <a:fillRect/>
+          </a:stretch>
+        </p:blipFill>
+        <p:spPr>
+          <a:xfrm>
+            <a:off x="1609807" y="3034215"/>
+            <a:ext cx="8972385" cy="789570"/>
+          </a:xfrm>
+          <a:prstGeom prst="rect">
+            <a:avLst/>
+          </a:prstGeom>
+        </p:spPr>
+      </p:pic>
+    </p:spTree>
+    <p:extLst>
+      <p:ext uri="{BB962C8B-B14F-4D97-AF65-F5344CB8AC3E}">
+        <p14:creationId xmlns:p14="http://schemas.microsoft.com/office/powerpoint/2010/main" val="2828427491"/>
+      </p:ext>
+    </p:extLst>
+  </p:cSld>
+  <p:clrMapOvr>
+    <a:masterClrMapping/>
+  </p:clrMapOvr>
+</p:sld>
+</file>
+
+<file path=ppt/slides/slide13.xml><?xml version="1.0" encoding="utf-8"?>
+<p:sld xmlns:a="http://schemas.openxmlformats.org/drawingml/2006/main" xmlns:r="http://schemas.openxmlformats.org/officeDocument/2006/relationships" xmlns:p="http://schemas.openxmlformats.org/presentationml/2006/main">
+  <p:cSld>
+    <p:spTree>
+      <p:nvGrpSpPr>
+        <p:cNvPr id="1" name=""/>
+        <p:cNvGrpSpPr/>
+        <p:nvPr/>
+      </p:nvGrpSpPr>
+      <p:grpSpPr>
+        <a:xfrm>
+          <a:off x="0" y="0"/>
+          <a:ext cx="0" cy="0"/>
+          <a:chOff x="0" y="0"/>
+          <a:chExt cx="0" cy="0"/>
+        </a:xfrm>
+      </p:grpSpPr>
+      <p:pic>
+        <p:nvPicPr>
+          <p:cNvPr id="6" name="그림 5">
+            <a:extLst>
+              <a:ext uri="{FF2B5EF4-FFF2-40B4-BE49-F238E27FC236}">
+                <a16:creationId xmlns:a16="http://schemas.microsoft.com/office/drawing/2014/main" id="{B4ABE927-7C5B-894E-98CF-8F9C180F7194}"/>
+              </a:ext>
+            </a:extLst>
+          </p:cNvPr>
+          <p:cNvPicPr>
+            <a:picLocks noChangeAspect="1"/>
+          </p:cNvPicPr>
+          <p:nvPr/>
+        </p:nvPicPr>
+        <p:blipFill>
+          <a:blip r:embed="rId2"/>
+          <a:stretch>
+            <a:fillRect/>
+          </a:stretch>
+        </p:blipFill>
+        <p:spPr>
+          <a:xfrm>
+            <a:off x="882332" y="3890601"/>
+            <a:ext cx="10488295" cy="699220"/>
+          </a:xfrm>
+          <a:prstGeom prst="rect">
+            <a:avLst/>
+          </a:prstGeom>
+        </p:spPr>
+      </p:pic>
+      <p:sp>
+        <p:nvSpPr>
+          <p:cNvPr id="2" name="제목 1">
+            <a:extLst>
+              <a:ext uri="{FF2B5EF4-FFF2-40B4-BE49-F238E27FC236}">
+                <a16:creationId xmlns:a16="http://schemas.microsoft.com/office/drawing/2014/main" id="{7B784487-77DC-4D81-92E2-91E64A538BEC}"/>
+              </a:ext>
+            </a:extLst>
+          </p:cNvPr>
+          <p:cNvSpPr>
+            <a:spLocks noGrp="1"/>
+          </p:cNvSpPr>
+          <p:nvPr>
+            <p:ph type="title"/>
+          </p:nvPr>
+        </p:nvSpPr>
+        <p:spPr/>
+        <p:txBody>
+          <a:bodyPr/>
+          <a:lstStyle/>
+          <a:p>
+            <a:r>
+              <a:rPr lang="en-US" altLang="ko-KR" dirty="0"/>
+              <a:t>Install K8s - 6</a:t>
+            </a:r>
+            <a:endParaRPr lang="ko-KR" altLang="en-US" dirty="0"/>
+          </a:p>
+        </p:txBody>
+      </p:sp>
+      <p:sp>
+        <p:nvSpPr>
+          <p:cNvPr id="3" name="내용 개체 틀 2">
+            <a:extLst>
+              <a:ext uri="{FF2B5EF4-FFF2-40B4-BE49-F238E27FC236}">
+                <a16:creationId xmlns:a16="http://schemas.microsoft.com/office/drawing/2014/main" id="{68B6CABF-44E6-45BA-9FCD-7A2412C0EF20}"/>
+              </a:ext>
+            </a:extLst>
+          </p:cNvPr>
+          <p:cNvSpPr>
+            <a:spLocks noGrp="1"/>
+          </p:cNvSpPr>
+          <p:nvPr>
+            <p:ph idx="1"/>
+          </p:nvPr>
+        </p:nvSpPr>
+        <p:spPr>
+          <a:xfrm>
+            <a:off x="1066800" y="2104289"/>
+            <a:ext cx="10058400" cy="4023360"/>
+          </a:xfrm>
+        </p:spPr>
+        <p:txBody>
+          <a:bodyPr>
+            <a:normAutofit/>
+          </a:bodyPr>
+          <a:lstStyle/>
+          <a:p>
+            <a:pPr>
+              <a:lnSpc>
+                <a:spcPct val="120000"/>
+              </a:lnSpc>
+            </a:pPr>
+            <a:r>
+              <a:rPr lang="en-US" altLang="ko-KR" sz="3200" dirty="0"/>
+              <a:t>- Apply built binary</a:t>
+            </a:r>
+          </a:p>
+          <a:p>
+            <a:pPr>
+              <a:lnSpc>
+                <a:spcPct val="120000"/>
+              </a:lnSpc>
+            </a:pPr>
+            <a:r>
+              <a:rPr lang="en-US" altLang="ko-KR" sz="3200" dirty="0">
+                <a:latin typeface="Consolas" panose="020B0609020204030204" pitchFamily="49" charset="0"/>
+                <a:cs typeface="Consolas" panose="020B0609020204030204" pitchFamily="49" charset="0"/>
+              </a:rPr>
+              <a:t> </a:t>
+            </a:r>
+            <a:r>
+              <a:rPr lang="en-US" altLang="ko-Kore-KR" dirty="0" err="1">
+                <a:latin typeface="Consolas" panose="020B0609020204030204" pitchFamily="49" charset="0"/>
+                <a:cs typeface="Consolas" panose="020B0609020204030204" pitchFamily="49" charset="0"/>
+              </a:rPr>
+              <a:t>sudo</a:t>
+            </a:r>
+            <a:r>
+              <a:rPr lang="en-US" altLang="ko-Kore-KR" dirty="0">
+                <a:latin typeface="Consolas" panose="020B0609020204030204" pitchFamily="49" charset="0"/>
+                <a:cs typeface="Consolas" panose="020B0609020204030204" pitchFamily="49" charset="0"/>
+              </a:rPr>
+              <a:t> vim /</a:t>
+            </a:r>
+            <a:r>
+              <a:rPr lang="en-US" altLang="ko-Kore-KR" dirty="0" err="1">
+                <a:latin typeface="Consolas" panose="020B0609020204030204" pitchFamily="49" charset="0"/>
+                <a:cs typeface="Consolas" panose="020B0609020204030204" pitchFamily="49" charset="0"/>
+              </a:rPr>
+              <a:t>etc</a:t>
+            </a:r>
+            <a:r>
+              <a:rPr lang="en-US" altLang="ko-Kore-KR" dirty="0">
+                <a:latin typeface="Consolas" panose="020B0609020204030204" pitchFamily="49" charset="0"/>
+                <a:cs typeface="Consolas" panose="020B0609020204030204" pitchFamily="49" charset="0"/>
+              </a:rPr>
+              <a:t>/</a:t>
+            </a:r>
+            <a:r>
+              <a:rPr lang="en-US" altLang="ko-Kore-KR" dirty="0" err="1">
+                <a:latin typeface="Consolas" panose="020B0609020204030204" pitchFamily="49" charset="0"/>
+                <a:cs typeface="Consolas" panose="020B0609020204030204" pitchFamily="49" charset="0"/>
+              </a:rPr>
+              <a:t>kubernetes</a:t>
+            </a:r>
+            <a:r>
+              <a:rPr lang="en-US" altLang="ko-Kore-KR" dirty="0">
+                <a:latin typeface="Consolas" panose="020B0609020204030204" pitchFamily="49" charset="0"/>
+                <a:cs typeface="Consolas" panose="020B0609020204030204" pitchFamily="49" charset="0"/>
+              </a:rPr>
+              <a:t>/manifests/</a:t>
+            </a:r>
+            <a:r>
+              <a:rPr lang="en-US" altLang="ko-Kore-KR" dirty="0" err="1">
+                <a:latin typeface="Consolas" panose="020B0609020204030204" pitchFamily="49" charset="0"/>
+                <a:cs typeface="Consolas" panose="020B0609020204030204" pitchFamily="49" charset="0"/>
+              </a:rPr>
+              <a:t>kube</a:t>
+            </a:r>
+            <a:r>
+              <a:rPr lang="en-US" altLang="ko-Kore-KR" dirty="0">
+                <a:latin typeface="Consolas" panose="020B0609020204030204" pitchFamily="49" charset="0"/>
+                <a:cs typeface="Consolas" panose="020B0609020204030204" pitchFamily="49" charset="0"/>
+              </a:rPr>
+              <a:t>-controller-manager</a:t>
+            </a:r>
+            <a:endParaRPr lang="en-US" altLang="ko-KR" dirty="0">
+              <a:latin typeface="Consolas" panose="020B0609020204030204" pitchFamily="49" charset="0"/>
+              <a:cs typeface="Consolas" panose="020B0609020204030204" pitchFamily="49" charset="0"/>
+            </a:endParaRPr>
+          </a:p>
+        </p:txBody>
+      </p:sp>
+      <p:sp>
+        <p:nvSpPr>
+          <p:cNvPr id="5" name="직사각형 4">
+            <a:extLst>
+              <a:ext uri="{FF2B5EF4-FFF2-40B4-BE49-F238E27FC236}">
+                <a16:creationId xmlns:a16="http://schemas.microsoft.com/office/drawing/2014/main" id="{95C28823-E4B9-4F45-A7DE-33DEECC0B1A9}"/>
+              </a:ext>
+            </a:extLst>
+          </p:cNvPr>
+          <p:cNvSpPr/>
+          <p:nvPr/>
+        </p:nvSpPr>
+        <p:spPr>
+          <a:xfrm>
+            <a:off x="1484416" y="4120738"/>
+            <a:ext cx="9825252" cy="283408"/>
+          </a:xfrm>
+          <a:prstGeom prst="rect">
+            <a:avLst/>
+          </a:prstGeom>
+          <a:noFill/>
+          <a:ln w="28575">
+            <a:solidFill>
+              <a:srgbClr val="FF0000"/>
+            </a:solidFill>
+          </a:ln>
+        </p:spPr>
+        <p:style>
+          <a:lnRef idx="2">
+            <a:schemeClr val="accent1">
+              <a:shade val="50000"/>
+            </a:schemeClr>
+          </a:lnRef>
+          <a:fillRef idx="1">
+            <a:schemeClr val="accent1"/>
+          </a:fillRef>
+          <a:effectRef idx="0">
+            <a:schemeClr val="accent1"/>
+          </a:effectRef>
+          <a:fontRef idx="minor">
+            <a:schemeClr val="lt1"/>
+          </a:fontRef>
+        </p:style>
+        <p:txBody>
+          <a:bodyPr rtlCol="0" anchor="ctr"/>
+          <a:lstStyle/>
+          <a:p>
+            <a:pPr algn="ctr"/>
+            <a:endParaRPr kumimoji="1" lang="ko-Kore-KR" altLang="en-US" dirty="0"/>
+          </a:p>
+        </p:txBody>
+      </p:sp>
+      <p:pic>
+        <p:nvPicPr>
+          <p:cNvPr id="8" name="그림 7">
+            <a:extLst>
+              <a:ext uri="{FF2B5EF4-FFF2-40B4-BE49-F238E27FC236}">
+                <a16:creationId xmlns:a16="http://schemas.microsoft.com/office/drawing/2014/main" id="{828D874D-6852-0E41-AD6F-CEA139AAA91F}"/>
+              </a:ext>
+            </a:extLst>
+          </p:cNvPr>
+          <p:cNvPicPr>
+            <a:picLocks noChangeAspect="1"/>
+          </p:cNvPicPr>
+          <p:nvPr/>
+        </p:nvPicPr>
+        <p:blipFill>
+          <a:blip r:embed="rId3">
+            <a:extLst>
+              <a:ext uri="{28A0092B-C50C-407E-A947-70E740481C1C}">
+                <a14:useLocalDpi xmlns:a14="http://schemas.microsoft.com/office/drawing/2010/main" val="0"/>
+              </a:ext>
+            </a:extLst>
+          </a:blip>
+          <a:stretch>
+            <a:fillRect/>
+          </a:stretch>
+        </p:blipFill>
+        <p:spPr>
+          <a:xfrm>
+            <a:off x="1681151" y="5178082"/>
+            <a:ext cx="8626632" cy="751470"/>
+          </a:xfrm>
+          <a:prstGeom prst="rect">
+            <a:avLst/>
+          </a:prstGeom>
+        </p:spPr>
+      </p:pic>
+    </p:spTree>
+    <p:extLst>
+      <p:ext uri="{BB962C8B-B14F-4D97-AF65-F5344CB8AC3E}">
+        <p14:creationId xmlns:p14="http://schemas.microsoft.com/office/powerpoint/2010/main" val="2571598881"/>
+      </p:ext>
+    </p:extLst>
+  </p:cSld>
+  <p:clrMapOvr>
+    <a:masterClrMapping/>
+  </p:clrMapOvr>
+</p:sld>
+</file>
+
+<file path=ppt/slides/slide14.xml><?xml version="1.0" encoding="utf-8"?>
+<p:sld xmlns:a="http://schemas.openxmlformats.org/drawingml/2006/main" xmlns:r="http://schemas.openxmlformats.org/officeDocument/2006/relationships" xmlns:p="http://schemas.openxmlformats.org/presentationml/2006/main">
+  <p:cSld>
+    <p:spTree>
+      <p:nvGrpSpPr>
+        <p:cNvPr id="1" name=""/>
+        <p:cNvGrpSpPr/>
+        <p:nvPr/>
+      </p:nvGrpSpPr>
+      <p:grpSpPr>
+        <a:xfrm>
+          <a:off x="0" y="0"/>
+          <a:ext cx="0" cy="0"/>
+          <a:chOff x="0" y="0"/>
+          <a:chExt cx="0" cy="0"/>
+        </a:xfrm>
+      </p:grpSpPr>
+      <p:sp>
+        <p:nvSpPr>
+          <p:cNvPr id="2" name="제목 1">
+            <a:extLst>
+              <a:ext uri="{FF2B5EF4-FFF2-40B4-BE49-F238E27FC236}">
+                <a16:creationId xmlns:a16="http://schemas.microsoft.com/office/drawing/2014/main" id="{DDAC8DF1-8C4A-4C5C-8FEA-35E979527464}"/>
+              </a:ext>
+            </a:extLst>
+          </p:cNvPr>
+          <p:cNvSpPr>
+            <a:spLocks noGrp="1"/>
+          </p:cNvSpPr>
+          <p:nvPr>
+            <p:ph type="ctrTitle"/>
+          </p:nvPr>
+        </p:nvSpPr>
+        <p:spPr/>
+        <p:txBody>
+          <a:bodyPr>
+            <a:normAutofit/>
+          </a:bodyPr>
+          <a:lstStyle/>
+          <a:p>
+            <a:r>
+              <a:rPr lang="en-US" altLang="ko-KR" sz="5800" dirty="0"/>
+              <a:t>Working</a:t>
+            </a:r>
+            <a:r>
+              <a:rPr lang="ko-KR" altLang="en-US" sz="5800" dirty="0"/>
+              <a:t> </a:t>
+            </a:r>
+            <a:r>
+              <a:rPr lang="en-US" altLang="ko-KR" sz="5800" dirty="0"/>
+              <a:t>with</a:t>
+            </a:r>
+            <a:r>
+              <a:rPr lang="ko-KR" altLang="en-US" sz="5800" dirty="0"/>
+              <a:t> </a:t>
+            </a:r>
+            <a:r>
+              <a:rPr lang="en-US" altLang="ko-KR" sz="5800" dirty="0"/>
+              <a:t>Kubernetes</a:t>
+            </a:r>
+            <a:endParaRPr lang="ko-KR" altLang="en-US" sz="5800" dirty="0"/>
+          </a:p>
+        </p:txBody>
+      </p:sp>
+      <p:sp>
+        <p:nvSpPr>
+          <p:cNvPr id="3" name="부제목 2">
+            <a:extLst>
+              <a:ext uri="{FF2B5EF4-FFF2-40B4-BE49-F238E27FC236}">
+                <a16:creationId xmlns:a16="http://schemas.microsoft.com/office/drawing/2014/main" id="{E0645A0E-A623-47E1-BF34-1399FD3792F3}"/>
+              </a:ext>
+            </a:extLst>
+          </p:cNvPr>
+          <p:cNvSpPr>
+            <a:spLocks noGrp="1"/>
+          </p:cNvSpPr>
+          <p:nvPr>
+            <p:ph type="subTitle" idx="1"/>
+          </p:nvPr>
+        </p:nvSpPr>
+        <p:spPr/>
+        <p:txBody>
+          <a:bodyPr/>
+          <a:lstStyle/>
+          <a:p>
+            <a:endParaRPr lang="ko-KR" altLang="en-US" dirty="0"/>
+          </a:p>
+        </p:txBody>
+      </p:sp>
+    </p:spTree>
+    <p:extLst>
+      <p:ext uri="{BB962C8B-B14F-4D97-AF65-F5344CB8AC3E}">
+        <p14:creationId xmlns:p14="http://schemas.microsoft.com/office/powerpoint/2010/main" val="794392143"/>
+      </p:ext>
+    </p:extLst>
+  </p:cSld>
+  <p:clrMapOvr>
+    <a:masterClrMapping/>
+  </p:clrMapOvr>
+</p:sld>
+</file>
+
+<file path=ppt/slides/slide15.xml><?xml version="1.0" encoding="utf-8"?>
+<p:sld xmlns:a="http://schemas.openxmlformats.org/drawingml/2006/main" xmlns:r="http://schemas.openxmlformats.org/officeDocument/2006/relationships" xmlns:p="http://schemas.openxmlformats.org/presentationml/2006/main">
+  <p:cSld>
+    <p:spTree>
+      <p:nvGrpSpPr>
+        <p:cNvPr id="1" name=""/>
+        <p:cNvGrpSpPr/>
+        <p:nvPr/>
+      </p:nvGrpSpPr>
+      <p:grpSpPr>
+        <a:xfrm>
+          <a:off x="0" y="0"/>
+          <a:ext cx="0" cy="0"/>
+          <a:chOff x="0" y="0"/>
+          <a:chExt cx="0" cy="0"/>
+        </a:xfrm>
+      </p:grpSpPr>
+      <p:sp>
+        <p:nvSpPr>
+          <p:cNvPr id="2" name="제목 1">
+            <a:extLst>
+              <a:ext uri="{FF2B5EF4-FFF2-40B4-BE49-F238E27FC236}">
+                <a16:creationId xmlns:a16="http://schemas.microsoft.com/office/drawing/2014/main" id="{7B784487-77DC-4D81-92E2-91E64A538BEC}"/>
+              </a:ext>
+            </a:extLst>
+          </p:cNvPr>
+          <p:cNvSpPr>
+            <a:spLocks noGrp="1"/>
+          </p:cNvSpPr>
+          <p:nvPr>
+            <p:ph type="title"/>
+          </p:nvPr>
+        </p:nvSpPr>
+        <p:spPr/>
+        <p:txBody>
+          <a:bodyPr/>
+          <a:lstStyle/>
+          <a:p>
+            <a:r>
+              <a:rPr lang="en-US" altLang="ko-KR" dirty="0" err="1"/>
+              <a:t>DashBoard</a:t>
+            </a:r>
+            <a:r>
+              <a:rPr lang="ko-KR" altLang="en-US" dirty="0"/>
+              <a:t> </a:t>
+            </a:r>
+            <a:r>
+              <a:rPr lang="en-US" altLang="ko-KR" dirty="0"/>
+              <a:t>(GUI)</a:t>
+            </a:r>
+            <a:endParaRPr lang="ko-KR" altLang="en-US" dirty="0"/>
+          </a:p>
+        </p:txBody>
+      </p:sp>
+      <p:sp>
+        <p:nvSpPr>
+          <p:cNvPr id="3" name="내용 개체 틀 2">
+            <a:extLst>
+              <a:ext uri="{FF2B5EF4-FFF2-40B4-BE49-F238E27FC236}">
+                <a16:creationId xmlns:a16="http://schemas.microsoft.com/office/drawing/2014/main" id="{68B6CABF-44E6-45BA-9FCD-7A2412C0EF20}"/>
+              </a:ext>
+            </a:extLst>
+          </p:cNvPr>
+          <p:cNvSpPr>
+            <a:spLocks noGrp="1"/>
+          </p:cNvSpPr>
+          <p:nvPr>
+            <p:ph idx="1"/>
+          </p:nvPr>
+        </p:nvSpPr>
+        <p:spPr>
+          <a:xfrm>
+            <a:off x="1221179" y="2080539"/>
+            <a:ext cx="10058400" cy="4023360"/>
+          </a:xfrm>
+        </p:spPr>
+        <p:txBody>
+          <a:bodyPr>
+            <a:normAutofit/>
+          </a:bodyPr>
+          <a:lstStyle/>
+          <a:p>
+            <a:pPr marL="0" indent="0">
+              <a:buNone/>
+            </a:pPr>
+            <a:r>
+              <a:rPr lang="en-US" altLang="ko-KR" b="1" dirty="0">
+                <a:latin typeface="Consolas" panose="020B0609020204030204" pitchFamily="49" charset="0"/>
+                <a:cs typeface="Consolas" panose="020B0609020204030204" pitchFamily="49" charset="0"/>
+              </a:rPr>
+              <a:t>Deploy dashboard:</a:t>
+            </a:r>
+          </a:p>
+          <a:p>
+            <a:pPr marL="0" indent="0">
+              <a:buNone/>
+            </a:pPr>
+            <a:r>
+              <a:rPr lang="en-US" altLang="ko-KR" dirty="0" err="1">
+                <a:latin typeface="Consolas" panose="020B0609020204030204" pitchFamily="49" charset="0"/>
+                <a:cs typeface="Consolas" panose="020B0609020204030204" pitchFamily="49" charset="0"/>
+              </a:rPr>
+              <a:t>kubectl</a:t>
+            </a:r>
+            <a:r>
+              <a:rPr lang="en-US" altLang="ko-KR" dirty="0">
+                <a:latin typeface="Consolas" panose="020B0609020204030204" pitchFamily="49" charset="0"/>
+                <a:cs typeface="Consolas" panose="020B0609020204030204" pitchFamily="49" charset="0"/>
+              </a:rPr>
+              <a:t> </a:t>
+            </a:r>
+            <a:r>
+              <a:rPr lang="en-US" altLang="ko-Kore-KR" dirty="0">
+                <a:latin typeface="Consolas" panose="020B0609020204030204" pitchFamily="49" charset="0"/>
+                <a:cs typeface="Consolas" panose="020B0609020204030204" pitchFamily="49" charset="0"/>
+              </a:rPr>
+              <a:t>apply -f https://</a:t>
+            </a:r>
+            <a:r>
+              <a:rPr lang="en-US" altLang="ko-Kore-KR" dirty="0" err="1">
+                <a:latin typeface="Consolas" panose="020B0609020204030204" pitchFamily="49" charset="0"/>
+                <a:cs typeface="Consolas" panose="020B0609020204030204" pitchFamily="49" charset="0"/>
+              </a:rPr>
+              <a:t>raw.githubusercontent.com</a:t>
+            </a:r>
+            <a:r>
+              <a:rPr lang="en-US" altLang="ko-Kore-KR" dirty="0">
+                <a:latin typeface="Consolas" panose="020B0609020204030204" pitchFamily="49" charset="0"/>
+                <a:cs typeface="Consolas" panose="020B0609020204030204" pitchFamily="49" charset="0"/>
+              </a:rPr>
+              <a:t>/</a:t>
+            </a:r>
+            <a:r>
+              <a:rPr lang="en-US" altLang="ko-Kore-KR" dirty="0" err="1">
+                <a:latin typeface="Consolas" panose="020B0609020204030204" pitchFamily="49" charset="0"/>
+                <a:cs typeface="Consolas" panose="020B0609020204030204" pitchFamily="49" charset="0"/>
+              </a:rPr>
+              <a:t>kubernetes</a:t>
+            </a:r>
+            <a:r>
+              <a:rPr lang="en-US" altLang="ko-Kore-KR" dirty="0">
+                <a:latin typeface="Consolas" panose="020B0609020204030204" pitchFamily="49" charset="0"/>
+                <a:cs typeface="Consolas" panose="020B0609020204030204" pitchFamily="49" charset="0"/>
+              </a:rPr>
+              <a:t>/dashboard/v2.0.0-beta8/</a:t>
+            </a:r>
+            <a:r>
+              <a:rPr lang="en-US" altLang="ko-Kore-KR" dirty="0" err="1">
+                <a:latin typeface="Consolas" panose="020B0609020204030204" pitchFamily="49" charset="0"/>
+                <a:cs typeface="Consolas" panose="020B0609020204030204" pitchFamily="49" charset="0"/>
+              </a:rPr>
+              <a:t>aio</a:t>
+            </a:r>
+            <a:r>
+              <a:rPr lang="en-US" altLang="ko-Kore-KR" dirty="0">
+                <a:latin typeface="Consolas" panose="020B0609020204030204" pitchFamily="49" charset="0"/>
+                <a:cs typeface="Consolas" panose="020B0609020204030204" pitchFamily="49" charset="0"/>
+              </a:rPr>
+              <a:t>/deploy/</a:t>
+            </a:r>
+            <a:r>
+              <a:rPr lang="en-US" altLang="ko-Kore-KR" dirty="0" err="1">
+                <a:latin typeface="Consolas" panose="020B0609020204030204" pitchFamily="49" charset="0"/>
+                <a:cs typeface="Consolas" panose="020B0609020204030204" pitchFamily="49" charset="0"/>
+              </a:rPr>
+              <a:t>recommended.yaml</a:t>
+            </a:r>
+            <a:endParaRPr lang="en-US" altLang="ko-KR" dirty="0">
+              <a:latin typeface="Consolas" panose="020B0609020204030204" pitchFamily="49" charset="0"/>
+              <a:cs typeface="Consolas" panose="020B0609020204030204" pitchFamily="49" charset="0"/>
+            </a:endParaRPr>
+          </a:p>
+          <a:p>
+            <a:pPr marL="0" indent="0">
+              <a:buNone/>
+            </a:pPr>
+            <a:endParaRPr lang="en-US" altLang="ko-KR" dirty="0">
+              <a:latin typeface="Consolas" panose="020B0609020204030204" pitchFamily="49" charset="0"/>
+              <a:cs typeface="Courier New" panose="02070309020205020404" pitchFamily="49" charset="0"/>
+            </a:endParaRPr>
+          </a:p>
+          <a:p>
+            <a:pPr marL="0" indent="0">
+              <a:buNone/>
+            </a:pPr>
+            <a:r>
+              <a:rPr lang="en-US" altLang="ko-KR" b="1" dirty="0"/>
+              <a:t>Enter </a:t>
+            </a:r>
+            <a:r>
+              <a:rPr lang="en-US" altLang="ko-Kore-KR" b="1" dirty="0">
+                <a:hlinkClick r:id="rId2"/>
+              </a:rPr>
+              <a:t>http://localhost:8001/api/v1/namespaces/kubernetes-dashboard/services/https:kubernetes-dashboard:/proxy/</a:t>
+            </a:r>
+            <a:endParaRPr lang="en-US" altLang="ko-KR" b="1" dirty="0"/>
+          </a:p>
+          <a:p>
+            <a:endParaRPr lang="ko-KR" altLang="en-US" b="1" dirty="0"/>
+          </a:p>
+        </p:txBody>
+      </p:sp>
+    </p:spTree>
+    <p:extLst>
+      <p:ext uri="{BB962C8B-B14F-4D97-AF65-F5344CB8AC3E}">
+        <p14:creationId xmlns:p14="http://schemas.microsoft.com/office/powerpoint/2010/main" val="2328054732"/>
+      </p:ext>
+    </p:extLst>
+  </p:cSld>
+  <p:clrMapOvr>
+    <a:masterClrMapping/>
+  </p:clrMapOvr>
+</p:sld>
+</file>
+
+<file path=ppt/slides/slide16.xml><?xml version="1.0" encoding="utf-8"?>
+<p:sld xmlns:a="http://schemas.openxmlformats.org/drawingml/2006/main" xmlns:r="http://schemas.openxmlformats.org/officeDocument/2006/relationships" xmlns:p="http://schemas.openxmlformats.org/presentationml/2006/main">
+  <p:cSld>
+    <p:spTree>
+      <p:nvGrpSpPr>
+        <p:cNvPr id="1" name=""/>
+        <p:cNvGrpSpPr/>
+        <p:nvPr/>
+      </p:nvGrpSpPr>
+      <p:grpSpPr>
+        <a:xfrm>
+          <a:off x="0" y="0"/>
+          <a:ext cx="0" cy="0"/>
+          <a:chOff x="0" y="0"/>
+          <a:chExt cx="0" cy="0"/>
+        </a:xfrm>
+      </p:grpSpPr>
+      <p:sp>
+        <p:nvSpPr>
+          <p:cNvPr id="2" name="제목 1">
+            <a:extLst>
+              <a:ext uri="{FF2B5EF4-FFF2-40B4-BE49-F238E27FC236}">
+                <a16:creationId xmlns:a16="http://schemas.microsoft.com/office/drawing/2014/main" id="{7B784487-77DC-4D81-92E2-91E64A538BEC}"/>
+              </a:ext>
+            </a:extLst>
+          </p:cNvPr>
+          <p:cNvSpPr>
+            <a:spLocks noGrp="1"/>
+          </p:cNvSpPr>
+          <p:nvPr>
+            <p:ph type="title"/>
+          </p:nvPr>
+        </p:nvSpPr>
+        <p:spPr/>
+        <p:txBody>
+          <a:bodyPr/>
+          <a:lstStyle/>
+          <a:p>
+            <a:r>
+              <a:rPr lang="en-US" altLang="ko-KR" dirty="0" err="1"/>
+              <a:t>DashBoard</a:t>
+            </a:r>
+            <a:r>
+              <a:rPr lang="ko-KR" altLang="en-US" dirty="0"/>
+              <a:t> </a:t>
+            </a:r>
+            <a:r>
+              <a:rPr lang="en-US" altLang="ko-KR" dirty="0"/>
+              <a:t>(GUI) - Token</a:t>
+            </a:r>
+            <a:endParaRPr lang="ko-KR" altLang="en-US" dirty="0"/>
+          </a:p>
+        </p:txBody>
+      </p:sp>
+      <p:sp>
+        <p:nvSpPr>
+          <p:cNvPr id="3" name="내용 개체 틀 2">
+            <a:extLst>
+              <a:ext uri="{FF2B5EF4-FFF2-40B4-BE49-F238E27FC236}">
+                <a16:creationId xmlns:a16="http://schemas.microsoft.com/office/drawing/2014/main" id="{68B6CABF-44E6-45BA-9FCD-7A2412C0EF20}"/>
+              </a:ext>
+            </a:extLst>
+          </p:cNvPr>
+          <p:cNvSpPr>
+            <a:spLocks noGrp="1"/>
+          </p:cNvSpPr>
+          <p:nvPr>
+            <p:ph idx="1"/>
+          </p:nvPr>
+        </p:nvSpPr>
+        <p:spPr>
+          <a:xfrm>
+            <a:off x="1066800" y="2104289"/>
+            <a:ext cx="10058400" cy="4023360"/>
+          </a:xfrm>
+        </p:spPr>
+        <p:txBody>
+          <a:bodyPr>
+            <a:normAutofit/>
+          </a:bodyPr>
+          <a:lstStyle/>
+          <a:p>
+            <a:pPr marL="0" indent="0">
+              <a:buNone/>
+            </a:pPr>
+            <a:endParaRPr lang="en-US" altLang="ko-KR" b="1" dirty="0">
+              <a:latin typeface="Consolas" panose="020B0609020204030204" pitchFamily="49" charset="0"/>
+              <a:cs typeface="Consolas" panose="020B0609020204030204" pitchFamily="49" charset="0"/>
+            </a:endParaRPr>
+          </a:p>
+        </p:txBody>
+      </p:sp>
+      <p:pic>
+        <p:nvPicPr>
+          <p:cNvPr id="4" name="그림 3">
+            <a:extLst>
+              <a:ext uri="{FF2B5EF4-FFF2-40B4-BE49-F238E27FC236}">
+                <a16:creationId xmlns:a16="http://schemas.microsoft.com/office/drawing/2014/main" id="{19B222BB-BD6B-494D-BDB2-EC0E0BC725DB}"/>
+              </a:ext>
+            </a:extLst>
+          </p:cNvPr>
+          <p:cNvPicPr>
+            <a:picLocks noChangeAspect="1"/>
+          </p:cNvPicPr>
+          <p:nvPr/>
+        </p:nvPicPr>
+        <p:blipFill>
+          <a:blip r:embed="rId2"/>
+          <a:stretch>
+            <a:fillRect/>
+          </a:stretch>
+        </p:blipFill>
+        <p:spPr>
+          <a:xfrm>
+            <a:off x="6126480" y="3168231"/>
+            <a:ext cx="4254500" cy="2755900"/>
+          </a:xfrm>
+          <a:prstGeom prst="rect">
+            <a:avLst/>
+          </a:prstGeom>
+        </p:spPr>
+      </p:pic>
+      <p:pic>
+        <p:nvPicPr>
+          <p:cNvPr id="6" name="그림 5">
+            <a:extLst>
+              <a:ext uri="{FF2B5EF4-FFF2-40B4-BE49-F238E27FC236}">
+                <a16:creationId xmlns:a16="http://schemas.microsoft.com/office/drawing/2014/main" id="{A887E329-3A44-0F4B-8D64-D462E9B054DC}"/>
+              </a:ext>
+            </a:extLst>
+          </p:cNvPr>
+          <p:cNvPicPr>
+            <a:picLocks noChangeAspect="1"/>
+          </p:cNvPicPr>
+          <p:nvPr/>
+        </p:nvPicPr>
+        <p:blipFill>
+          <a:blip r:embed="rId3"/>
+          <a:stretch>
+            <a:fillRect/>
+          </a:stretch>
+        </p:blipFill>
+        <p:spPr>
+          <a:xfrm>
+            <a:off x="1097280" y="3449219"/>
+            <a:ext cx="3644900" cy="1333500"/>
+          </a:xfrm>
+          <a:prstGeom prst="rect">
+            <a:avLst/>
+          </a:prstGeom>
+        </p:spPr>
+      </p:pic>
+      <p:sp>
+        <p:nvSpPr>
+          <p:cNvPr id="7" name="TextBox 6">
+            <a:extLst>
+              <a:ext uri="{FF2B5EF4-FFF2-40B4-BE49-F238E27FC236}">
+                <a16:creationId xmlns:a16="http://schemas.microsoft.com/office/drawing/2014/main" id="{A6264F0A-1077-C74D-A5BD-105528547106}"/>
+              </a:ext>
+            </a:extLst>
+          </p:cNvPr>
+          <p:cNvSpPr txBox="1"/>
+          <p:nvPr/>
+        </p:nvSpPr>
+        <p:spPr>
+          <a:xfrm>
+            <a:off x="1555275" y="2798899"/>
+            <a:ext cx="2586037" cy="369332"/>
+          </a:xfrm>
+          <a:prstGeom prst="rect">
+            <a:avLst/>
+          </a:prstGeom>
+          <a:noFill/>
+        </p:spPr>
+        <p:txBody>
+          <a:bodyPr wrap="square" rtlCol="0">
+            <a:spAutoFit/>
+          </a:bodyPr>
+          <a:lstStyle/>
+          <a:p>
+            <a:r>
+              <a:rPr kumimoji="1" lang="en-US" altLang="ko-Kore-KR" dirty="0" err="1"/>
+              <a:t>admin_user_account.yml</a:t>
+            </a:r>
+            <a:endParaRPr kumimoji="1" lang="ko-Kore-KR" altLang="en-US" dirty="0"/>
+          </a:p>
+        </p:txBody>
+      </p:sp>
+      <p:sp>
+        <p:nvSpPr>
+          <p:cNvPr id="8" name="TextBox 7">
+            <a:extLst>
+              <a:ext uri="{FF2B5EF4-FFF2-40B4-BE49-F238E27FC236}">
+                <a16:creationId xmlns:a16="http://schemas.microsoft.com/office/drawing/2014/main" id="{8674B376-FF1C-8D43-8695-5F8897B55DE4}"/>
+              </a:ext>
+            </a:extLst>
+          </p:cNvPr>
+          <p:cNvSpPr txBox="1"/>
+          <p:nvPr/>
+        </p:nvSpPr>
+        <p:spPr>
+          <a:xfrm>
+            <a:off x="6941105" y="2798899"/>
+            <a:ext cx="2586037" cy="369332"/>
+          </a:xfrm>
+          <a:prstGeom prst="rect">
+            <a:avLst/>
+          </a:prstGeom>
+          <a:noFill/>
+        </p:spPr>
+        <p:txBody>
+          <a:bodyPr wrap="square" rtlCol="0">
+            <a:spAutoFit/>
+          </a:bodyPr>
+          <a:lstStyle/>
+          <a:p>
+            <a:r>
+              <a:rPr kumimoji="1" lang="en-US" altLang="ko-Kore-KR" dirty="0" err="1"/>
+              <a:t>admin_user_role.yml</a:t>
+            </a:r>
+            <a:endParaRPr kumimoji="1" lang="ko-Kore-KR" altLang="en-US" dirty="0"/>
+          </a:p>
+        </p:txBody>
+      </p:sp>
+    </p:spTree>
+    <p:extLst>
+      <p:ext uri="{BB962C8B-B14F-4D97-AF65-F5344CB8AC3E}">
+        <p14:creationId xmlns:p14="http://schemas.microsoft.com/office/powerpoint/2010/main" val="1525654810"/>
+      </p:ext>
+    </p:extLst>
+  </p:cSld>
+  <p:clrMapOvr>
+    <a:masterClrMapping/>
+  </p:clrMapOvr>
+</p:sld>
+</file>
+
+<file path=ppt/slides/slide17.xml><?xml version="1.0" encoding="utf-8"?>
+<p:sld xmlns:a="http://schemas.openxmlformats.org/drawingml/2006/main" xmlns:r="http://schemas.openxmlformats.org/officeDocument/2006/relationships" xmlns:p="http://schemas.openxmlformats.org/presentationml/2006/main">
+  <p:cSld>
+    <p:spTree>
+      <p:nvGrpSpPr>
+        <p:cNvPr id="1" name=""/>
+        <p:cNvGrpSpPr/>
+        <p:nvPr/>
+      </p:nvGrpSpPr>
+      <p:grpSpPr>
+        <a:xfrm>
+          <a:off x="0" y="0"/>
+          <a:ext cx="0" cy="0"/>
+          <a:chOff x="0" y="0"/>
+          <a:chExt cx="0" cy="0"/>
+        </a:xfrm>
+      </p:grpSpPr>
+      <p:sp>
+        <p:nvSpPr>
+          <p:cNvPr id="2" name="제목 1">
+            <a:extLst>
+              <a:ext uri="{FF2B5EF4-FFF2-40B4-BE49-F238E27FC236}">
+                <a16:creationId xmlns:a16="http://schemas.microsoft.com/office/drawing/2014/main" id="{7B784487-77DC-4D81-92E2-91E64A538BEC}"/>
+              </a:ext>
+            </a:extLst>
+          </p:cNvPr>
+          <p:cNvSpPr>
+            <a:spLocks noGrp="1"/>
+          </p:cNvSpPr>
+          <p:nvPr>
+            <p:ph type="title"/>
+          </p:nvPr>
+        </p:nvSpPr>
+        <p:spPr/>
+        <p:txBody>
+          <a:bodyPr/>
+          <a:lstStyle/>
+          <a:p>
+            <a:r>
+              <a:rPr lang="en-US" altLang="ko-KR" dirty="0" err="1"/>
+              <a:t>DashBoard</a:t>
+            </a:r>
+            <a:r>
+              <a:rPr lang="ko-KR" altLang="en-US" dirty="0"/>
+              <a:t> </a:t>
+            </a:r>
+            <a:r>
+              <a:rPr lang="en-US" altLang="ko-KR" dirty="0"/>
+              <a:t>(GUI) - Token</a:t>
+            </a:r>
+            <a:endParaRPr lang="ko-KR" altLang="en-US" dirty="0"/>
+          </a:p>
+        </p:txBody>
+      </p:sp>
+      <p:sp>
+        <p:nvSpPr>
+          <p:cNvPr id="3" name="내용 개체 틀 2">
+            <a:extLst>
+              <a:ext uri="{FF2B5EF4-FFF2-40B4-BE49-F238E27FC236}">
+                <a16:creationId xmlns:a16="http://schemas.microsoft.com/office/drawing/2014/main" id="{68B6CABF-44E6-45BA-9FCD-7A2412C0EF20}"/>
+              </a:ext>
+            </a:extLst>
+          </p:cNvPr>
+          <p:cNvSpPr>
+            <a:spLocks noGrp="1"/>
+          </p:cNvSpPr>
+          <p:nvPr>
+            <p:ph idx="1"/>
+          </p:nvPr>
+        </p:nvSpPr>
+        <p:spPr>
+          <a:xfrm>
+            <a:off x="1209304" y="2080538"/>
+            <a:ext cx="10058400" cy="4023360"/>
+          </a:xfrm>
+        </p:spPr>
+        <p:txBody>
+          <a:bodyPr>
+            <a:normAutofit/>
+          </a:bodyPr>
+          <a:lstStyle/>
+          <a:p>
+            <a:pPr marL="0" indent="0">
+              <a:buNone/>
+            </a:pPr>
+            <a:r>
+              <a:rPr lang="en-US" altLang="ko-KR" dirty="0" err="1">
+                <a:latin typeface="Consolas" panose="020B0609020204030204" pitchFamily="49" charset="0"/>
+                <a:cs typeface="Consolas" panose="020B0609020204030204" pitchFamily="49" charset="0"/>
+              </a:rPr>
+              <a:t>kubectl</a:t>
+            </a:r>
+            <a:r>
+              <a:rPr lang="en-US" altLang="ko-KR" dirty="0">
+                <a:latin typeface="Consolas" panose="020B0609020204030204" pitchFamily="49" charset="0"/>
+                <a:cs typeface="Consolas" panose="020B0609020204030204" pitchFamily="49" charset="0"/>
+              </a:rPr>
+              <a:t> apply –f </a:t>
+            </a:r>
+            <a:r>
+              <a:rPr lang="en-US" altLang="ko-KR" dirty="0" err="1">
+                <a:latin typeface="Consolas" panose="020B0609020204030204" pitchFamily="49" charset="0"/>
+                <a:cs typeface="Consolas" panose="020B0609020204030204" pitchFamily="49" charset="0"/>
+              </a:rPr>
+              <a:t>admin_user_account.yml</a:t>
+            </a:r>
+            <a:endParaRPr lang="en-US" altLang="ko-KR" dirty="0">
+              <a:latin typeface="Consolas" panose="020B0609020204030204" pitchFamily="49" charset="0"/>
+              <a:cs typeface="Consolas" panose="020B0609020204030204" pitchFamily="49" charset="0"/>
+            </a:endParaRPr>
+          </a:p>
+          <a:p>
+            <a:pPr marL="0" indent="0">
+              <a:buNone/>
+            </a:pPr>
+            <a:r>
+              <a:rPr lang="en-US" altLang="ko-KR" dirty="0" err="1">
+                <a:latin typeface="Consolas" panose="020B0609020204030204" pitchFamily="49" charset="0"/>
+                <a:cs typeface="Consolas" panose="020B0609020204030204" pitchFamily="49" charset="0"/>
+              </a:rPr>
+              <a:t>kubectl</a:t>
+            </a:r>
+            <a:r>
+              <a:rPr lang="en-US" altLang="ko-KR" dirty="0">
+                <a:latin typeface="Consolas" panose="020B0609020204030204" pitchFamily="49" charset="0"/>
+                <a:cs typeface="Consolas" panose="020B0609020204030204" pitchFamily="49" charset="0"/>
+              </a:rPr>
+              <a:t> apply –f </a:t>
+            </a:r>
+            <a:r>
+              <a:rPr lang="en-US" altLang="ko-KR" dirty="0" err="1">
+                <a:latin typeface="Consolas" panose="020B0609020204030204" pitchFamily="49" charset="0"/>
+                <a:cs typeface="Consolas" panose="020B0609020204030204" pitchFamily="49" charset="0"/>
+              </a:rPr>
+              <a:t>admin_user_role.yml</a:t>
+            </a:r>
+            <a:endParaRPr lang="en-US" altLang="ko-KR" dirty="0">
+              <a:latin typeface="Consolas" panose="020B0609020204030204" pitchFamily="49" charset="0"/>
+              <a:cs typeface="Consolas" panose="020B0609020204030204" pitchFamily="49" charset="0"/>
+            </a:endParaRPr>
+          </a:p>
+          <a:p>
+            <a:pPr marL="0" indent="0">
+              <a:buNone/>
+            </a:pPr>
+            <a:r>
+              <a:rPr lang="en-US" altLang="ko-Kore-KR" dirty="0" err="1">
+                <a:latin typeface="Consolas" panose="020B0609020204030204" pitchFamily="49" charset="0"/>
+                <a:cs typeface="Consolas" panose="020B0609020204030204" pitchFamily="49" charset="0"/>
+              </a:rPr>
+              <a:t>kubectl</a:t>
+            </a:r>
+            <a:r>
+              <a:rPr lang="en-US" altLang="ko-Kore-KR" dirty="0">
+                <a:latin typeface="Consolas" panose="020B0609020204030204" pitchFamily="49" charset="0"/>
+                <a:cs typeface="Consolas" panose="020B0609020204030204" pitchFamily="49" charset="0"/>
+              </a:rPr>
+              <a:t> -n </a:t>
+            </a:r>
+            <a:r>
+              <a:rPr lang="en-US" altLang="ko-Kore-KR" dirty="0" err="1">
+                <a:latin typeface="Consolas" panose="020B0609020204030204" pitchFamily="49" charset="0"/>
+                <a:cs typeface="Consolas" panose="020B0609020204030204" pitchFamily="49" charset="0"/>
+              </a:rPr>
+              <a:t>kubernetes</a:t>
+            </a:r>
+            <a:r>
+              <a:rPr lang="en-US" altLang="ko-Kore-KR" dirty="0">
+                <a:latin typeface="Consolas" panose="020B0609020204030204" pitchFamily="49" charset="0"/>
+                <a:cs typeface="Consolas" panose="020B0609020204030204" pitchFamily="49" charset="0"/>
+              </a:rPr>
+              <a:t>-dashboard describe secret $(</a:t>
+            </a:r>
+            <a:r>
+              <a:rPr lang="en-US" altLang="ko-Kore-KR" dirty="0" err="1">
+                <a:latin typeface="Consolas" panose="020B0609020204030204" pitchFamily="49" charset="0"/>
+                <a:cs typeface="Consolas" panose="020B0609020204030204" pitchFamily="49" charset="0"/>
+              </a:rPr>
+              <a:t>kubectl</a:t>
+            </a:r>
+            <a:r>
+              <a:rPr lang="en-US" altLang="ko-Kore-KR" dirty="0">
+                <a:latin typeface="Consolas" panose="020B0609020204030204" pitchFamily="49" charset="0"/>
+                <a:cs typeface="Consolas" panose="020B0609020204030204" pitchFamily="49" charset="0"/>
+              </a:rPr>
+              <a:t> -n </a:t>
+            </a:r>
+            <a:r>
+              <a:rPr lang="en-US" altLang="ko-Kore-KR" dirty="0" err="1">
+                <a:latin typeface="Consolas" panose="020B0609020204030204" pitchFamily="49" charset="0"/>
+                <a:cs typeface="Consolas" panose="020B0609020204030204" pitchFamily="49" charset="0"/>
+              </a:rPr>
+              <a:t>kubernetes</a:t>
+            </a:r>
+            <a:r>
+              <a:rPr lang="en-US" altLang="ko-Kore-KR" dirty="0">
+                <a:latin typeface="Consolas" panose="020B0609020204030204" pitchFamily="49" charset="0"/>
+                <a:cs typeface="Consolas" panose="020B0609020204030204" pitchFamily="49" charset="0"/>
+              </a:rPr>
+              <a:t>-dashboard get secret | grep admin-user | </a:t>
+            </a:r>
+            <a:r>
+              <a:rPr lang="en-US" altLang="ko-Kore-KR" dirty="0" err="1">
+                <a:latin typeface="Consolas" panose="020B0609020204030204" pitchFamily="49" charset="0"/>
+                <a:cs typeface="Consolas" panose="020B0609020204030204" pitchFamily="49" charset="0"/>
+              </a:rPr>
+              <a:t>awk</a:t>
+            </a:r>
+            <a:r>
+              <a:rPr lang="en-US" altLang="ko-Kore-KR" dirty="0">
+                <a:latin typeface="Consolas" panose="020B0609020204030204" pitchFamily="49" charset="0"/>
+                <a:cs typeface="Consolas" panose="020B0609020204030204" pitchFamily="49" charset="0"/>
+              </a:rPr>
+              <a:t> '{print $1}')</a:t>
+            </a:r>
+            <a:endParaRPr lang="en-US" altLang="ko-KR" dirty="0">
+              <a:latin typeface="Consolas" panose="020B0609020204030204" pitchFamily="49" charset="0"/>
+              <a:cs typeface="Consolas" panose="020B0609020204030204" pitchFamily="49" charset="0"/>
+            </a:endParaRPr>
+          </a:p>
+          <a:p>
+            <a:pPr marL="0" indent="0">
+              <a:buNone/>
+            </a:pPr>
+            <a:endParaRPr lang="en-US" altLang="ko-KR" dirty="0">
+              <a:latin typeface="Consolas" panose="020B0609020204030204" pitchFamily="49" charset="0"/>
+              <a:cs typeface="Consolas" panose="020B0609020204030204" pitchFamily="49" charset="0"/>
+            </a:endParaRPr>
+          </a:p>
+        </p:txBody>
+      </p:sp>
+      <p:pic>
+        <p:nvPicPr>
+          <p:cNvPr id="5" name="그림 4">
+            <a:extLst>
+              <a:ext uri="{FF2B5EF4-FFF2-40B4-BE49-F238E27FC236}">
+                <a16:creationId xmlns:a16="http://schemas.microsoft.com/office/drawing/2014/main" id="{3C831997-A31F-1B40-B5CA-AF455C6BDF6F}"/>
+              </a:ext>
+            </a:extLst>
+          </p:cNvPr>
+          <p:cNvPicPr>
+            <a:picLocks noChangeAspect="1"/>
+          </p:cNvPicPr>
+          <p:nvPr/>
+        </p:nvPicPr>
+        <p:blipFill rotWithShape="1">
+          <a:blip r:embed="rId2"/>
+          <a:srcRect t="44972"/>
+          <a:stretch/>
+        </p:blipFill>
+        <p:spPr>
+          <a:xfrm>
+            <a:off x="2269330" y="3890502"/>
+            <a:ext cx="6846095" cy="2084251"/>
+          </a:xfrm>
+          <a:prstGeom prst="rect">
+            <a:avLst/>
+          </a:prstGeom>
+        </p:spPr>
+      </p:pic>
+    </p:spTree>
+    <p:extLst>
+      <p:ext uri="{BB962C8B-B14F-4D97-AF65-F5344CB8AC3E}">
+        <p14:creationId xmlns:p14="http://schemas.microsoft.com/office/powerpoint/2010/main" val="1775846859"/>
+      </p:ext>
+    </p:extLst>
+  </p:cSld>
+  <p:clrMapOvr>
+    <a:masterClrMapping/>
+  </p:clrMapOvr>
+</p:sld>
+</file>
+
+<file path=ppt/slides/slide18.xml><?xml version="1.0" encoding="utf-8"?>
+<p:sld xmlns:a="http://schemas.openxmlformats.org/drawingml/2006/main" xmlns:r="http://schemas.openxmlformats.org/officeDocument/2006/relationships" xmlns:p="http://schemas.openxmlformats.org/presentationml/2006/main">
+  <p:cSld>
+    <p:spTree>
+      <p:nvGrpSpPr>
+        <p:cNvPr id="1" name=""/>
+        <p:cNvGrpSpPr/>
+        <p:nvPr/>
+      </p:nvGrpSpPr>
+      <p:grpSpPr>
+        <a:xfrm>
+          <a:off x="0" y="0"/>
+          <a:ext cx="0" cy="0"/>
+          <a:chOff x="0" y="0"/>
+          <a:chExt cx="0" cy="0"/>
+        </a:xfrm>
+      </p:grpSpPr>
+      <p:sp>
+        <p:nvSpPr>
+          <p:cNvPr id="2" name="제목 1">
+            <a:extLst>
+              <a:ext uri="{FF2B5EF4-FFF2-40B4-BE49-F238E27FC236}">
+                <a16:creationId xmlns:a16="http://schemas.microsoft.com/office/drawing/2014/main" id="{7B784487-77DC-4D81-92E2-91E64A538BEC}"/>
+              </a:ext>
+            </a:extLst>
+          </p:cNvPr>
+          <p:cNvSpPr>
+            <a:spLocks noGrp="1"/>
+          </p:cNvSpPr>
+          <p:nvPr>
+            <p:ph type="title"/>
+          </p:nvPr>
+        </p:nvSpPr>
+        <p:spPr/>
+        <p:txBody>
+          <a:bodyPr/>
+          <a:lstStyle/>
+          <a:p>
+            <a:r>
+              <a:rPr lang="en-US" altLang="ko-KR" dirty="0"/>
+              <a:t>Metric Server</a:t>
+            </a:r>
+            <a:endParaRPr lang="ko-KR" altLang="en-US" dirty="0"/>
+          </a:p>
+        </p:txBody>
+      </p:sp>
+      <p:sp>
+        <p:nvSpPr>
+          <p:cNvPr id="3" name="내용 개체 틀 2">
+            <a:extLst>
+              <a:ext uri="{FF2B5EF4-FFF2-40B4-BE49-F238E27FC236}">
+                <a16:creationId xmlns:a16="http://schemas.microsoft.com/office/drawing/2014/main" id="{68B6CABF-44E6-45BA-9FCD-7A2412C0EF20}"/>
+              </a:ext>
+            </a:extLst>
+          </p:cNvPr>
+          <p:cNvSpPr>
+            <a:spLocks noGrp="1"/>
+          </p:cNvSpPr>
+          <p:nvPr>
+            <p:ph idx="1"/>
+          </p:nvPr>
+        </p:nvSpPr>
+        <p:spPr>
+          <a:xfrm>
+            <a:off x="1218180" y="2080538"/>
+            <a:ext cx="10058400" cy="4023360"/>
+          </a:xfrm>
+        </p:spPr>
+        <p:txBody>
+          <a:bodyPr>
+            <a:normAutofit lnSpcReduction="10000"/>
+          </a:bodyPr>
+          <a:lstStyle/>
+          <a:p>
+            <a:pPr marL="0" indent="0">
+              <a:buNone/>
+            </a:pPr>
+            <a:r>
+              <a:rPr lang="en-US" altLang="ko-KR" b="1" dirty="0">
+                <a:latin typeface="Consolas" panose="020B0609020204030204" pitchFamily="49" charset="0"/>
+                <a:cs typeface="Consolas" panose="020B0609020204030204" pitchFamily="49" charset="0"/>
+              </a:rPr>
+              <a:t>Fetch metric server:</a:t>
+            </a:r>
+          </a:p>
+          <a:p>
+            <a:pPr marL="0" indent="0">
+              <a:buNone/>
+            </a:pPr>
+            <a:r>
+              <a:rPr lang="en-US" altLang="ko-KR" dirty="0" err="1">
+                <a:latin typeface="Consolas" panose="020B0609020204030204" pitchFamily="49" charset="0"/>
+                <a:cs typeface="Consolas" panose="020B0609020204030204" pitchFamily="49" charset="0"/>
+              </a:rPr>
+              <a:t>wget</a:t>
+            </a:r>
+            <a:r>
+              <a:rPr lang="en-US" altLang="ko-KR" dirty="0">
+                <a:latin typeface="Consolas" panose="020B0609020204030204" pitchFamily="49" charset="0"/>
+                <a:cs typeface="Consolas" panose="020B0609020204030204" pitchFamily="49" charset="0"/>
+              </a:rPr>
+              <a:t> </a:t>
+            </a:r>
+            <a:r>
+              <a:rPr lang="en-US" altLang="ko-Kore-KR" dirty="0">
+                <a:latin typeface="Consolas" panose="020B0609020204030204" pitchFamily="49" charset="0"/>
+                <a:cs typeface="Consolas" panose="020B0609020204030204" pitchFamily="49" charset="0"/>
+                <a:hlinkClick r:id="rId2"/>
+              </a:rPr>
+              <a:t>https://github.com/kubernetes-sigs/metrics-server/releases/download/v0.3.6/components.yaml</a:t>
+            </a:r>
+            <a:endParaRPr lang="en-US" altLang="ko-Kore-KR" dirty="0">
+              <a:latin typeface="Consolas" panose="020B0609020204030204" pitchFamily="49" charset="0"/>
+              <a:cs typeface="Consolas" panose="020B0609020204030204" pitchFamily="49" charset="0"/>
+            </a:endParaRPr>
+          </a:p>
+          <a:p>
+            <a:pPr marL="0" indent="0">
+              <a:buNone/>
+            </a:pPr>
+            <a:endParaRPr lang="en-US" altLang="ko-Kore-KR" dirty="0">
+              <a:latin typeface="Consolas" panose="020B0609020204030204" pitchFamily="49" charset="0"/>
+              <a:cs typeface="Consolas" panose="020B0609020204030204" pitchFamily="49" charset="0"/>
+            </a:endParaRPr>
+          </a:p>
+          <a:p>
+            <a:pPr marL="0" indent="0">
+              <a:buNone/>
+            </a:pPr>
+            <a:endParaRPr lang="en-US" altLang="ko-Kore-KR" dirty="0">
+              <a:latin typeface="Consolas" panose="020B0609020204030204" pitchFamily="49" charset="0"/>
+              <a:cs typeface="Consolas" panose="020B0609020204030204" pitchFamily="49" charset="0"/>
+            </a:endParaRPr>
+          </a:p>
+          <a:p>
+            <a:pPr marL="0" indent="0">
+              <a:buNone/>
+            </a:pPr>
+            <a:endParaRPr lang="en-US" altLang="ko-Kore-KR" dirty="0">
+              <a:latin typeface="Consolas" panose="020B0609020204030204" pitchFamily="49" charset="0"/>
+              <a:cs typeface="Consolas" panose="020B0609020204030204" pitchFamily="49" charset="0"/>
+            </a:endParaRPr>
+          </a:p>
+          <a:p>
+            <a:pPr marL="0" indent="0">
+              <a:buNone/>
+            </a:pPr>
+            <a:endParaRPr lang="en-US" altLang="ko-Kore-KR" dirty="0">
+              <a:latin typeface="Consolas" panose="020B0609020204030204" pitchFamily="49" charset="0"/>
+              <a:cs typeface="Consolas" panose="020B0609020204030204" pitchFamily="49" charset="0"/>
+            </a:endParaRPr>
+          </a:p>
+          <a:p>
+            <a:pPr marL="0" indent="0">
+              <a:buNone/>
+            </a:pPr>
+            <a:endParaRPr lang="en-US" altLang="ko-Kore-KR" dirty="0">
+              <a:latin typeface="Consolas" panose="020B0609020204030204" pitchFamily="49" charset="0"/>
+              <a:cs typeface="Consolas" panose="020B0609020204030204" pitchFamily="49" charset="0"/>
+            </a:endParaRPr>
+          </a:p>
+          <a:p>
+            <a:pPr marL="0" indent="0">
+              <a:buNone/>
+            </a:pPr>
+            <a:endParaRPr lang="en-US" altLang="ko-Kore-KR" dirty="0">
+              <a:latin typeface="Consolas" panose="020B0609020204030204" pitchFamily="49" charset="0"/>
+              <a:cs typeface="Consolas" panose="020B0609020204030204" pitchFamily="49" charset="0"/>
+            </a:endParaRPr>
+          </a:p>
+          <a:p>
+            <a:pPr marL="0" indent="0">
+              <a:buNone/>
+            </a:pPr>
+            <a:r>
+              <a:rPr lang="en-US" altLang="ko-KR" dirty="0" err="1">
+                <a:latin typeface="Consolas" panose="020B0609020204030204" pitchFamily="49" charset="0"/>
+                <a:cs typeface="Consolas" panose="020B0609020204030204" pitchFamily="49" charset="0"/>
+              </a:rPr>
+              <a:t>kubectl</a:t>
+            </a:r>
+            <a:r>
+              <a:rPr lang="en-US" altLang="ko-KR" dirty="0">
+                <a:latin typeface="Consolas" panose="020B0609020204030204" pitchFamily="49" charset="0"/>
+                <a:cs typeface="Consolas" panose="020B0609020204030204" pitchFamily="49" charset="0"/>
+              </a:rPr>
+              <a:t> apply –f </a:t>
+            </a:r>
+            <a:r>
+              <a:rPr lang="en-US" altLang="ko-KR" dirty="0" err="1">
+                <a:latin typeface="Consolas" panose="020B0609020204030204" pitchFamily="49" charset="0"/>
+                <a:cs typeface="Consolas" panose="020B0609020204030204" pitchFamily="49" charset="0"/>
+              </a:rPr>
+              <a:t>components.yaml</a:t>
+            </a:r>
+            <a:endParaRPr lang="en-US" altLang="ko-KR" dirty="0">
+              <a:latin typeface="Consolas" panose="020B0609020204030204" pitchFamily="49" charset="0"/>
+              <a:cs typeface="Consolas" panose="020B0609020204030204" pitchFamily="49" charset="0"/>
+            </a:endParaRPr>
+          </a:p>
+          <a:p>
+            <a:pPr marL="0" indent="0">
+              <a:buNone/>
+            </a:pPr>
+            <a:endParaRPr lang="en-US" altLang="ko-Kore-KR" dirty="0">
+              <a:latin typeface="Consolas" panose="020B0609020204030204" pitchFamily="49" charset="0"/>
+              <a:cs typeface="Consolas" panose="020B0609020204030204" pitchFamily="49" charset="0"/>
+            </a:endParaRPr>
+          </a:p>
+          <a:p>
+            <a:pPr marL="0" indent="0">
+              <a:buNone/>
+            </a:pPr>
+            <a:endParaRPr lang="en-US" altLang="ko-KR" dirty="0">
+              <a:latin typeface="Consolas" panose="020B0609020204030204" pitchFamily="49" charset="0"/>
+              <a:cs typeface="Consolas" panose="020B0609020204030204" pitchFamily="49" charset="0"/>
+            </a:endParaRPr>
+          </a:p>
+          <a:p>
+            <a:pPr marL="0" indent="0">
+              <a:buNone/>
+            </a:pPr>
+            <a:endParaRPr lang="ko-KR" altLang="en-US" dirty="0">
+              <a:latin typeface="Consolas" panose="020B0609020204030204" pitchFamily="49" charset="0"/>
+              <a:cs typeface="Consolas" panose="020B0609020204030204" pitchFamily="49" charset="0"/>
+            </a:endParaRPr>
+          </a:p>
+        </p:txBody>
+      </p:sp>
+      <p:pic>
+        <p:nvPicPr>
+          <p:cNvPr id="4" name="그림 3">
+            <a:extLst>
+              <a:ext uri="{FF2B5EF4-FFF2-40B4-BE49-F238E27FC236}">
+                <a16:creationId xmlns:a16="http://schemas.microsoft.com/office/drawing/2014/main" id="{50C0EAE2-E568-1C4A-AB2E-72F2DDFB1DD0}"/>
+              </a:ext>
+            </a:extLst>
+          </p:cNvPr>
+          <p:cNvPicPr>
+            <a:picLocks noChangeAspect="1"/>
+          </p:cNvPicPr>
+          <p:nvPr/>
+        </p:nvPicPr>
+        <p:blipFill>
+          <a:blip r:embed="rId3"/>
+          <a:stretch>
+            <a:fillRect/>
+          </a:stretch>
+        </p:blipFill>
+        <p:spPr>
+          <a:xfrm>
+            <a:off x="1717439" y="3375482"/>
+            <a:ext cx="7124700" cy="1930400"/>
+          </a:xfrm>
+          <a:prstGeom prst="rect">
+            <a:avLst/>
+          </a:prstGeom>
+        </p:spPr>
+      </p:pic>
+      <p:sp>
+        <p:nvSpPr>
+          <p:cNvPr id="5" name="직사각형 4">
+            <a:extLst>
+              <a:ext uri="{FF2B5EF4-FFF2-40B4-BE49-F238E27FC236}">
+                <a16:creationId xmlns:a16="http://schemas.microsoft.com/office/drawing/2014/main" id="{8B1FFD47-2AA4-7848-A9ED-BB7021C6B7A6}"/>
+              </a:ext>
+            </a:extLst>
+          </p:cNvPr>
+          <p:cNvSpPr/>
+          <p:nvPr/>
+        </p:nvSpPr>
+        <p:spPr>
+          <a:xfrm>
+            <a:off x="3194463" y="4092218"/>
+            <a:ext cx="5440818" cy="540142"/>
+          </a:xfrm>
+          <a:prstGeom prst="rect">
+            <a:avLst/>
+          </a:prstGeom>
+          <a:noFill/>
+          <a:ln w="28575">
+            <a:solidFill>
+              <a:srgbClr val="FF0000"/>
+            </a:solidFill>
+          </a:ln>
+        </p:spPr>
+        <p:style>
+          <a:lnRef idx="2">
+            <a:schemeClr val="accent1">
+              <a:shade val="50000"/>
+            </a:schemeClr>
+          </a:lnRef>
+          <a:fillRef idx="1">
+            <a:schemeClr val="accent1"/>
+          </a:fillRef>
+          <a:effectRef idx="0">
+            <a:schemeClr val="accent1"/>
+          </a:effectRef>
+          <a:fontRef idx="minor">
+            <a:schemeClr val="lt1"/>
+          </a:fontRef>
+        </p:style>
+        <p:txBody>
+          <a:bodyPr rtlCol="0" anchor="ctr"/>
+          <a:lstStyle/>
+          <a:p>
+            <a:pPr algn="ctr"/>
+            <a:endParaRPr kumimoji="1" lang="ko-Kore-KR" altLang="en-US"/>
+          </a:p>
+        </p:txBody>
+      </p:sp>
+      <p:sp>
+        <p:nvSpPr>
+          <p:cNvPr id="6" name="TextBox 5">
+            <a:extLst>
+              <a:ext uri="{FF2B5EF4-FFF2-40B4-BE49-F238E27FC236}">
+                <a16:creationId xmlns:a16="http://schemas.microsoft.com/office/drawing/2014/main" id="{DE8028E3-CF11-1C49-81CF-29E39FCF19C1}"/>
+              </a:ext>
+            </a:extLst>
+          </p:cNvPr>
+          <p:cNvSpPr txBox="1"/>
+          <p:nvPr/>
+        </p:nvSpPr>
+        <p:spPr>
+          <a:xfrm>
+            <a:off x="9740705" y="3986029"/>
+            <a:ext cx="2434441" cy="646331"/>
+          </a:xfrm>
+          <a:prstGeom prst="rect">
+            <a:avLst/>
+          </a:prstGeom>
+          <a:noFill/>
+        </p:spPr>
+        <p:txBody>
+          <a:bodyPr wrap="square" rtlCol="0">
+            <a:spAutoFit/>
+          </a:bodyPr>
+          <a:lstStyle/>
+          <a:p>
+            <a:r>
+              <a:rPr kumimoji="1" lang="en-US" altLang="ko-Kore-KR" dirty="0"/>
+              <a:t>Add to </a:t>
+            </a:r>
+            <a:r>
+              <a:rPr kumimoji="1" lang="en-US" altLang="ko-Kore-KR" dirty="0" err="1"/>
+              <a:t>components.yaml</a:t>
+            </a:r>
+            <a:endParaRPr kumimoji="1" lang="ko-Kore-KR" altLang="en-US" dirty="0"/>
+          </a:p>
+        </p:txBody>
+      </p:sp>
+      <p:cxnSp>
+        <p:nvCxnSpPr>
+          <p:cNvPr id="8" name="직선 화살표 연결선 7">
+            <a:extLst>
+              <a:ext uri="{FF2B5EF4-FFF2-40B4-BE49-F238E27FC236}">
+                <a16:creationId xmlns:a16="http://schemas.microsoft.com/office/drawing/2014/main" id="{CB852D97-2EAA-3E43-B2DE-321BB6235DAD}"/>
+              </a:ext>
+            </a:extLst>
+          </p:cNvPr>
+          <p:cNvCxnSpPr>
+            <a:stCxn id="6" idx="1"/>
+            <a:endCxn id="4" idx="3"/>
+          </p:cNvCxnSpPr>
+          <p:nvPr/>
+        </p:nvCxnSpPr>
+        <p:spPr>
+          <a:xfrm flipH="1">
+            <a:off x="8842139" y="4309195"/>
+            <a:ext cx="898566" cy="31487"/>
+          </a:xfrm>
+          <a:prstGeom prst="straightConnector1">
+            <a:avLst/>
+          </a:prstGeom>
+          <a:ln>
+            <a:tailEnd type="triangle"/>
+          </a:ln>
+        </p:spPr>
+        <p:style>
+          <a:lnRef idx="1">
+            <a:schemeClr val="accent1"/>
+          </a:lnRef>
+          <a:fillRef idx="0">
+            <a:schemeClr val="accent1"/>
+          </a:fillRef>
+          <a:effectRef idx="0">
+            <a:schemeClr val="accent1"/>
+          </a:effectRef>
+          <a:fontRef idx="minor">
+            <a:schemeClr val="tx1"/>
+          </a:fontRef>
+        </p:style>
+      </p:cxnSp>
+    </p:spTree>
+    <p:extLst>
+      <p:ext uri="{BB962C8B-B14F-4D97-AF65-F5344CB8AC3E}">
+        <p14:creationId xmlns:p14="http://schemas.microsoft.com/office/powerpoint/2010/main" val="3903993245"/>
+      </p:ext>
+    </p:extLst>
+  </p:cSld>
+  <p:clrMapOvr>
+    <a:masterClrMapping/>
+  </p:clrMapOvr>
+</p:sld>
+</file>
+
 <file path=ppt/slides/slide2.xml><?xml version="1.0" encoding="utf-8"?>
 <p:sld xmlns:a="http://schemas.openxmlformats.org/drawingml/2006/main" xmlns:r="http://schemas.openxmlformats.org/officeDocument/2006/relationships" xmlns:p="http://schemas.openxmlformats.org/presentationml/2006/main">
   <p:cSld>
@@ -3934,10 +6290,10 @@
           <a:lstStyle/>
           <a:p>
             <a:r>
-              <a:rPr lang="en-US" altLang="ko-KR" dirty="0"/>
+              <a:rPr lang="en-US" altLang="ko-KR" b="1" dirty="0"/>
               <a:t>Prerequisite</a:t>
             </a:r>
-            <a:endParaRPr lang="ko-KR" altLang="en-US" dirty="0"/>
+            <a:endParaRPr lang="ko-KR" altLang="en-US" b="1" dirty="0"/>
           </a:p>
         </p:txBody>
       </p:sp>
@@ -3976,7 +6332,7 @@
             </a:pPr>
             <a:r>
               <a:rPr lang="en-US" altLang="ko-KR" sz="2800" dirty="0"/>
-              <a:t>- An ubuntu server (version 18.04+)</a:t>
+              <a:t>- An ubuntu master server (version 18.04+)</a:t>
             </a:r>
           </a:p>
           <a:p>
@@ -3998,7 +6354,7 @@
             </a:pPr>
             <a:r>
               <a:rPr lang="en-US" altLang="ko-KR" sz="2800" dirty="0"/>
-              <a:t>- 30GB of free space</a:t>
+              <a:t>- 60GB of free space</a:t>
             </a:r>
           </a:p>
           <a:p>
@@ -4108,7 +6464,7 @@
           <a:lstStyle/>
           <a:p>
             <a:r>
-              <a:rPr lang="en-US" altLang="ko-KR" sz="3200" dirty="0"/>
+              <a:rPr lang="en-US" altLang="ko-KR" sz="3200" b="1" dirty="0"/>
               <a:t>- Install docker</a:t>
             </a:r>
           </a:p>
@@ -4251,14 +6607,45 @@
             </a:r>
           </a:p>
           <a:p>
-            <a:endParaRPr lang="en-US" altLang="ko-KR" dirty="0">
-              <a:latin typeface="Consolas" panose="020B0609020204030204" pitchFamily="49" charset="0"/>
-              <a:cs typeface="Courier New" panose="02070309020205020404" pitchFamily="49" charset="0"/>
-            </a:endParaRPr>
-          </a:p>
-          <a:p>
-            <a:r>
-              <a:rPr lang="en-US" altLang="ko-KR" sz="3200" dirty="0"/>
+            <a:r>
+              <a:rPr lang="en-US" altLang="ko-KR" dirty="0">
+                <a:latin typeface="Consolas" panose="020B0609020204030204" pitchFamily="49" charset="0"/>
+                <a:cs typeface="Courier New" panose="02070309020205020404" pitchFamily="49" charset="0"/>
+              </a:rPr>
+              <a:t>  </a:t>
+            </a:r>
+            <a:r>
+              <a:rPr lang="en-US" altLang="ko-KR" dirty="0" err="1">
+                <a:latin typeface="Consolas" panose="020B0609020204030204" pitchFamily="49" charset="0"/>
+                <a:cs typeface="Courier New" panose="02070309020205020404" pitchFamily="49" charset="0"/>
+              </a:rPr>
+              <a:t>sudo</a:t>
+            </a:r>
+            <a:r>
+              <a:rPr lang="en-US" altLang="ko-KR" dirty="0">
+                <a:latin typeface="Consolas" panose="020B0609020204030204" pitchFamily="49" charset="0"/>
+                <a:cs typeface="Courier New" panose="02070309020205020404" pitchFamily="49" charset="0"/>
+              </a:rPr>
+              <a:t> </a:t>
+            </a:r>
+            <a:r>
+              <a:rPr lang="en-US" altLang="ko-KR" dirty="0" err="1">
+                <a:latin typeface="Consolas" panose="020B0609020204030204" pitchFamily="49" charset="0"/>
+                <a:cs typeface="Courier New" panose="02070309020205020404" pitchFamily="49" charset="0"/>
+              </a:rPr>
+              <a:t>systemctl</a:t>
+            </a:r>
+            <a:r>
+              <a:rPr lang="en-US" altLang="ko-KR" dirty="0">
+                <a:latin typeface="Consolas" panose="020B0609020204030204" pitchFamily="49" charset="0"/>
+                <a:cs typeface="Courier New" panose="02070309020205020404" pitchFamily="49" charset="0"/>
+              </a:rPr>
+              <a:t> enable docker</a:t>
+            </a:r>
+          </a:p>
+          <a:p>
+            <a:r>
+              <a:rPr lang="en-US" altLang="ko-KR" sz="3200" b="1" dirty="0"/>
               <a:t>- Install compilation and other tools</a:t>
             </a:r>
           </a:p>
@@ -4368,7 +6755,7 @@
           <a:p>
             <a:r>
               <a:rPr lang="en-US" altLang="ko-KR" dirty="0"/>
-              <a:t>Building K8s From Source - 3</a:t>
+              <a:t>Building K8s From Source - 2</a:t>
             </a:r>
             <a:endParaRPr lang="ko-KR" altLang="en-US" dirty="0"/>
           </a:p>
@@ -4398,16 +6785,13 @@
         </p:spPr>
         <p:txBody>
           <a:bodyPr>
-            <a:normAutofit lnSpcReduction="10000"/>
+            <a:normAutofit/>
           </a:bodyPr>
           <a:lstStyle/>
           <a:p>
-            <a:pPr marL="0" indent="0">
-              <a:buNone/>
-            </a:pPr>
-            <a:r>
-              <a:rPr lang="en-US" altLang="ko-KR" sz="3200" dirty="0"/>
-              <a:t>- Install go</a:t>
+            <a:r>
+              <a:rPr lang="en-US" altLang="ko-KR" sz="3200" b="1" dirty="0"/>
+              <a:t>- Compile and build K8s</a:t>
             </a:r>
           </a:p>
           <a:p>
@@ -4416,30 +6800,14 @@
                 <a:latin typeface="Consolas" panose="020B0609020204030204" pitchFamily="49" charset="0"/>
                 <a:cs typeface="Courier New" panose="02070309020205020404" pitchFamily="49" charset="0"/>
               </a:rPr>
-              <a:t>  curl </a:t>
-            </a:r>
-            <a:r>
-              <a:rPr lang="en-US" altLang="ko-KR" dirty="0">
+              <a:t>  git clone https://github.com/kubernetes/</a:t>
+            </a:r>
+            <a:r>
+              <a:rPr lang="en-US" altLang="ko-KR" dirty="0" err="1">
                 <a:latin typeface="Consolas" panose="020B0609020204030204" pitchFamily="49" charset="0"/>
                 <a:cs typeface="Courier New" panose="02070309020205020404" pitchFamily="49" charset="0"/>
-                <a:hlinkClick r:id="rId2"/>
-              </a:rPr>
-              <a:t>–</a:t>
-            </a:r>
-            <a:r>
-              <a:rPr lang="en-US" altLang="ko-KR" dirty="0">
-                <a:latin typeface="Consolas" panose="020B0609020204030204" pitchFamily="49" charset="0"/>
-                <a:cs typeface="Courier New" panose="02070309020205020404" pitchFamily="49" charset="0"/>
-              </a:rPr>
-              <a:t>O </a:t>
-            </a:r>
-            <a:r>
-              <a:rPr lang="en-US" altLang="ko-KR" dirty="0">
-                <a:latin typeface="Consolas" panose="020B0609020204030204" pitchFamily="49" charset="0"/>
-                <a:cs typeface="Courier New" panose="02070309020205020404" pitchFamily="49" charset="0"/>
-                <a:hlinkClick r:id="rId2"/>
-              </a:rPr>
-              <a:t>https://dl.google.com/go/go1.13.4.linux-amd64.tar.gz</a:t>
+              </a:rPr>
+              <a:t>kubernetes</a:t>
             </a:r>
             <a:endParaRPr lang="en-US" altLang="ko-KR" dirty="0">
               <a:latin typeface="Consolas" panose="020B0609020204030204" pitchFamily="49" charset="0"/>
@@ -4452,101 +6820,41 @@
                 <a:latin typeface="Consolas" panose="020B0609020204030204" pitchFamily="49" charset="0"/>
                 <a:cs typeface="Courier New" panose="02070309020205020404" pitchFamily="49" charset="0"/>
               </a:rPr>
-              <a:t>  </a:t>
+              <a:t>  cd </a:t>
             </a:r>
             <a:r>
               <a:rPr lang="en-US" altLang="ko-KR" dirty="0" err="1">
                 <a:latin typeface="Consolas" panose="020B0609020204030204" pitchFamily="49" charset="0"/>
                 <a:cs typeface="Courier New" panose="02070309020205020404" pitchFamily="49" charset="0"/>
               </a:rPr>
-              <a:t>sudo</a:t>
-            </a:r>
+              <a:t>kubernetes</a:t>
+            </a:r>
+            <a:endParaRPr lang="en-US" altLang="ko-KR" dirty="0">
+              <a:latin typeface="Consolas" panose="020B0609020204030204" pitchFamily="49" charset="0"/>
+              <a:cs typeface="Courier New" panose="02070309020205020404" pitchFamily="49" charset="0"/>
+            </a:endParaRPr>
+          </a:p>
+          <a:p>
             <a:r>
               <a:rPr lang="en-US" altLang="ko-KR" dirty="0">
                 <a:latin typeface="Consolas" panose="020B0609020204030204" pitchFamily="49" charset="0"/>
                 <a:cs typeface="Courier New" panose="02070309020205020404" pitchFamily="49" charset="0"/>
               </a:rPr>
-              <a:t> tar –C /</a:t>
-            </a:r>
-            <a:r>
-              <a:rPr lang="en-US" altLang="ko-KR" dirty="0" err="1">
-                <a:latin typeface="Consolas" panose="020B0609020204030204" pitchFamily="49" charset="0"/>
-                <a:cs typeface="Courier New" panose="02070309020205020404" pitchFamily="49" charset="0"/>
-              </a:rPr>
-              <a:t>usr</a:t>
-            </a:r>
-            <a:r>
-              <a:rPr lang="en-US" altLang="ko-KR" dirty="0">
-                <a:latin typeface="Consolas" panose="020B0609020204030204" pitchFamily="49" charset="0"/>
-                <a:cs typeface="Courier New" panose="02070309020205020404" pitchFamily="49" charset="0"/>
-              </a:rPr>
-              <a:t>/local –</a:t>
-            </a:r>
-            <a:r>
-              <a:rPr lang="en-US" altLang="ko-KR" dirty="0" err="1">
-                <a:latin typeface="Consolas" panose="020B0609020204030204" pitchFamily="49" charset="0"/>
-                <a:cs typeface="Courier New" panose="02070309020205020404" pitchFamily="49" charset="0"/>
-              </a:rPr>
-              <a:t>xzf</a:t>
-            </a:r>
-            <a:r>
-              <a:rPr lang="en-US" altLang="ko-KR" dirty="0">
-                <a:latin typeface="Consolas" panose="020B0609020204030204" pitchFamily="49" charset="0"/>
-                <a:cs typeface="Courier New" panose="02070309020205020404" pitchFamily="49" charset="0"/>
-              </a:rPr>
-              <a:t> go1.13.4.linux-amd64.tar.gz</a:t>
-            </a:r>
-          </a:p>
-          <a:p>
-            <a:endParaRPr lang="en-US" altLang="ko-KR" dirty="0"/>
-          </a:p>
-          <a:p>
-            <a:r>
-              <a:rPr lang="en-US" altLang="ko-KR" b="1" dirty="0"/>
-              <a:t>  Add following line to $HOME/.profile:</a:t>
-            </a:r>
-          </a:p>
-          <a:p>
-            <a:pPr marL="0" indent="0">
-              <a:buNone/>
-            </a:pPr>
-            <a:r>
-              <a:rPr lang="en-US" altLang="ko-KR" dirty="0"/>
-              <a:t>    export PATH=$PATH:/</a:t>
-            </a:r>
-            <a:r>
-              <a:rPr lang="en-US" altLang="ko-KR" dirty="0" err="1"/>
-              <a:t>usr</a:t>
-            </a:r>
-            <a:r>
-              <a:rPr lang="en-US" altLang="ko-KR" dirty="0"/>
-              <a:t>/local/go/bin</a:t>
-            </a:r>
-          </a:p>
-          <a:p>
-            <a:pPr marL="0" indent="0">
-              <a:buNone/>
-            </a:pPr>
-            <a:endParaRPr lang="en-US" altLang="ko-KR" dirty="0"/>
-          </a:p>
-          <a:p>
-            <a:r>
-              <a:rPr lang="en-US" altLang="ko-KR" b="1" dirty="0"/>
-              <a:t>  Then:</a:t>
-            </a:r>
-          </a:p>
-          <a:p>
-            <a:r>
-              <a:rPr lang="en-US" altLang="ko-KR" dirty="0"/>
-              <a:t>  source $HOME/.profile</a:t>
-            </a:r>
+              <a:t>  make quick-release</a:t>
+            </a:r>
+          </a:p>
+          <a:p>
+            <a:endParaRPr lang="en-US" altLang="ko-KR" b="1" dirty="0"/>
+          </a:p>
+          <a:p>
+            <a:endParaRPr lang="en-US" altLang="ko-KR" b="1" dirty="0"/>
           </a:p>
         </p:txBody>
       </p:sp>
     </p:spTree>
     <p:extLst>
       <p:ext uri="{BB962C8B-B14F-4D97-AF65-F5344CB8AC3E}">
-        <p14:creationId xmlns:p14="http://schemas.microsoft.com/office/powerpoint/2010/main" val="2418989940"/>
+        <p14:creationId xmlns:p14="http://schemas.microsoft.com/office/powerpoint/2010/main" val="4070451159"/>
       </p:ext>
     </p:extLst>
   </p:cSld>
@@ -4596,7 +6904,7 @@
           <a:p>
             <a:r>
               <a:rPr lang="en-US" altLang="ko-KR" dirty="0"/>
-              <a:t>Building K8s From Source - 4</a:t>
+              <a:t>Building K8s From Source - 2</a:t>
             </a:r>
             <a:endParaRPr lang="ko-KR" altLang="en-US" dirty="0"/>
           </a:p>
@@ -4626,13 +6934,13 @@
         </p:spPr>
         <p:txBody>
           <a:bodyPr>
-            <a:normAutofit lnSpcReduction="10000"/>
+            <a:normAutofit/>
           </a:bodyPr>
           <a:lstStyle/>
           <a:p>
             <a:r>
-              <a:rPr lang="en-US" altLang="ko-KR" sz="3200" dirty="0"/>
-              <a:t>- Compile and run K8s</a:t>
+              <a:rPr lang="en-US" altLang="ko-KR" sz="3200" b="1" dirty="0"/>
+              <a:t>- Load Binary as Docker Image</a:t>
             </a:r>
           </a:p>
           <a:p>
@@ -4641,14 +6949,83 @@
                 <a:latin typeface="Consolas" panose="020B0609020204030204" pitchFamily="49" charset="0"/>
                 <a:cs typeface="Courier New" panose="02070309020205020404" pitchFamily="49" charset="0"/>
               </a:rPr>
-              <a:t>  git clone --depth 1 https://github.com/kubernetes/</a:t>
+              <a:t>  cd _output/release-tars</a:t>
+            </a:r>
+          </a:p>
+          <a:p>
+            <a:r>
+              <a:rPr lang="en-US" altLang="ko-KR" dirty="0">
+                <a:latin typeface="Consolas" panose="020B0609020204030204" pitchFamily="49" charset="0"/>
+                <a:cs typeface="Courier New" panose="02070309020205020404" pitchFamily="49" charset="0"/>
+              </a:rPr>
+              <a:t>  tar –</a:t>
             </a:r>
             <a:r>
               <a:rPr lang="en-US" altLang="ko-KR" dirty="0" err="1">
                 <a:latin typeface="Consolas" panose="020B0609020204030204" pitchFamily="49" charset="0"/>
                 <a:cs typeface="Courier New" panose="02070309020205020404" pitchFamily="49" charset="0"/>
               </a:rPr>
+              <a:t>xvf</a:t>
+            </a:r>
+            <a:r>
+              <a:rPr lang="en-US" altLang="ko-KR" dirty="0">
+                <a:latin typeface="Consolas" panose="020B0609020204030204" pitchFamily="49" charset="0"/>
+                <a:cs typeface="Courier New" panose="02070309020205020404" pitchFamily="49" charset="0"/>
+              </a:rPr>
+              <a:t> kubernetes-server-linux-amd64.tar.gz</a:t>
+            </a:r>
+          </a:p>
+          <a:p>
+            <a:r>
+              <a:rPr lang="en-US" altLang="ko-KR" dirty="0">
+                <a:latin typeface="Consolas" panose="020B0609020204030204" pitchFamily="49" charset="0"/>
+                <a:cs typeface="Courier New" panose="02070309020205020404" pitchFamily="49" charset="0"/>
+              </a:rPr>
+              <a:t>  cd </a:t>
+            </a:r>
+            <a:r>
+              <a:rPr lang="en-US" altLang="ko-KR" dirty="0" err="1">
+                <a:latin typeface="Consolas" panose="020B0609020204030204" pitchFamily="49" charset="0"/>
+                <a:cs typeface="Courier New" panose="02070309020205020404" pitchFamily="49" charset="0"/>
+              </a:rPr>
               <a:t>kubernetes</a:t>
+            </a:r>
+            <a:r>
+              <a:rPr lang="en-US" altLang="ko-KR" dirty="0">
+                <a:latin typeface="Consolas" panose="020B0609020204030204" pitchFamily="49" charset="0"/>
+                <a:cs typeface="Courier New" panose="02070309020205020404" pitchFamily="49" charset="0"/>
+              </a:rPr>
+              <a:t>/server/bin</a:t>
+            </a:r>
+          </a:p>
+          <a:p>
+            <a:r>
+              <a:rPr lang="en-US" altLang="ko-KR" dirty="0">
+                <a:latin typeface="Consolas" panose="020B0609020204030204" pitchFamily="49" charset="0"/>
+                <a:cs typeface="Courier New" panose="02070309020205020404" pitchFamily="49" charset="0"/>
+              </a:rPr>
+              <a:t>  docker load &lt; </a:t>
+            </a:r>
+            <a:r>
+              <a:rPr lang="en-US" altLang="ko-KR" dirty="0" err="1">
+                <a:latin typeface="Consolas" panose="020B0609020204030204" pitchFamily="49" charset="0"/>
+                <a:cs typeface="Courier New" panose="02070309020205020404" pitchFamily="49" charset="0"/>
+              </a:rPr>
+              <a:t>kube</a:t>
+            </a:r>
+            <a:r>
+              <a:rPr lang="en-US" altLang="ko-KR" dirty="0">
+                <a:latin typeface="Consolas" panose="020B0609020204030204" pitchFamily="49" charset="0"/>
+                <a:cs typeface="Courier New" panose="02070309020205020404" pitchFamily="49" charset="0"/>
+              </a:rPr>
+              <a:t>-controller-</a:t>
+            </a:r>
+            <a:r>
+              <a:rPr lang="en-US" altLang="ko-KR" dirty="0" err="1">
+                <a:latin typeface="Consolas" panose="020B0609020204030204" pitchFamily="49" charset="0"/>
+                <a:cs typeface="Courier New" panose="02070309020205020404" pitchFamily="49" charset="0"/>
+              </a:rPr>
+              <a:t>manager.tar</a:t>
             </a:r>
             <a:endParaRPr lang="en-US" altLang="ko-KR" dirty="0">
               <a:latin typeface="Consolas" panose="020B0609020204030204" pitchFamily="49" charset="0"/>
@@ -4661,61 +7038,7 @@
                 <a:latin typeface="Consolas" panose="020B0609020204030204" pitchFamily="49" charset="0"/>
                 <a:cs typeface="Courier New" panose="02070309020205020404" pitchFamily="49" charset="0"/>
               </a:rPr>
-              <a:t>  cd </a:t>
-            </a:r>
-            <a:r>
-              <a:rPr lang="en-US" altLang="ko-KR" dirty="0" err="1">
-                <a:latin typeface="Consolas" panose="020B0609020204030204" pitchFamily="49" charset="0"/>
-                <a:cs typeface="Courier New" panose="02070309020205020404" pitchFamily="49" charset="0"/>
-              </a:rPr>
-              <a:t>kubernetes</a:t>
-            </a:r>
-            <a:endParaRPr lang="en-US" altLang="ko-KR" dirty="0">
-              <a:latin typeface="Consolas" panose="020B0609020204030204" pitchFamily="49" charset="0"/>
-              <a:cs typeface="Courier New" panose="02070309020205020404" pitchFamily="49" charset="0"/>
-            </a:endParaRPr>
-          </a:p>
-          <a:p>
-            <a:r>
-              <a:rPr lang="en-US" altLang="ko-KR" dirty="0">
-                <a:latin typeface="Consolas" panose="020B0609020204030204" pitchFamily="49" charset="0"/>
-                <a:cs typeface="Courier New" panose="02070309020205020404" pitchFamily="49" charset="0"/>
-              </a:rPr>
-              <a:t>  export KUBERNETES_PROVIDER=local</a:t>
-            </a:r>
-          </a:p>
-          <a:p>
-            <a:r>
-              <a:rPr lang="en-US" altLang="ko-KR" dirty="0">
-                <a:latin typeface="Consolas" panose="020B0609020204030204" pitchFamily="49" charset="0"/>
-                <a:cs typeface="Courier New" panose="02070309020205020404" pitchFamily="49" charset="0"/>
-              </a:rPr>
-              <a:t>  hack/install-</a:t>
-            </a:r>
-            <a:r>
-              <a:rPr lang="en-US" altLang="ko-KR" dirty="0" err="1">
-                <a:latin typeface="Consolas" panose="020B0609020204030204" pitchFamily="49" charset="0"/>
-                <a:cs typeface="Courier New" panose="02070309020205020404" pitchFamily="49" charset="0"/>
-              </a:rPr>
-              <a:t>etcd.sh</a:t>
-            </a:r>
-            <a:endParaRPr lang="en-US" altLang="ko-KR" dirty="0">
-              <a:latin typeface="Consolas" panose="020B0609020204030204" pitchFamily="49" charset="0"/>
-              <a:cs typeface="Courier New" panose="02070309020205020404" pitchFamily="49" charset="0"/>
-            </a:endParaRPr>
-          </a:p>
-          <a:p>
-            <a:r>
-              <a:rPr lang="en-US" altLang="ko-KR" b="1" dirty="0"/>
-              <a:t>      Add </a:t>
-            </a:r>
-            <a:r>
-              <a:rPr lang="en-US" altLang="ko-KR" b="1" dirty="0" err="1"/>
-              <a:t>etcd</a:t>
-            </a:r>
-            <a:r>
-              <a:rPr lang="en-US" altLang="ko-KR" b="1" dirty="0"/>
-              <a:t> to PATH:</a:t>
+              <a:t>  docker images	</a:t>
             </a:r>
           </a:p>
           <a:p>
@@ -4723,13 +7046,6 @@
           </a:p>
           <a:p>
             <a:endParaRPr lang="en-US" altLang="ko-KR" b="1" dirty="0"/>
-          </a:p>
-          <a:p>
-            <a:r>
-              <a:rPr lang="en-US" altLang="ko-KR" dirty="0"/>
-              <a:t>     source $HOME/.profile</a:t>
-            </a:r>
-            <a:endParaRPr lang="ko-KR" altLang="en-US" dirty="0"/>
           </a:p>
         </p:txBody>
       </p:sp>
@@ -4738,7 +7054,7 @@
           <p:cNvPr id="4" name="그림 3">
             <a:extLst>
               <a:ext uri="{FF2B5EF4-FFF2-40B4-BE49-F238E27FC236}">
-                <a16:creationId xmlns:a16="http://schemas.microsoft.com/office/drawing/2014/main" id="{9B719FA6-C15C-694F-8465-45975E79F638}"/>
+                <a16:creationId xmlns:a16="http://schemas.microsoft.com/office/drawing/2014/main" id="{0DCBB097-726F-1844-8A2F-C1E21C760916}"/>
               </a:ext>
             </a:extLst>
           </p:cNvPr>
@@ -4747,109 +7063,25 @@
           </p:cNvPicPr>
           <p:nvPr/>
         </p:nvPicPr>
-        <p:blipFill>
+        <p:blipFill rotWithShape="1">
           <a:blip r:embed="rId2"/>
-          <a:stretch>
-            <a:fillRect/>
-          </a:stretch>
+          <a:srcRect t="1" r="32515" b="-19186"/>
+          <a:stretch/>
         </p:blipFill>
         <p:spPr>
           <a:xfrm>
-            <a:off x="1617022" y="4851970"/>
-            <a:ext cx="8153400" cy="482600"/>
+            <a:off x="1875274" y="5066883"/>
+            <a:ext cx="8227695" cy="631788"/>
           </a:xfrm>
           <a:prstGeom prst="rect">
             <a:avLst/>
           </a:prstGeom>
         </p:spPr>
       </p:pic>
-      <p:sp>
-        <p:nvSpPr>
-          <p:cNvPr id="5" name="TextBox 4">
-            <a:extLst>
-              <a:ext uri="{FF2B5EF4-FFF2-40B4-BE49-F238E27FC236}">
-                <a16:creationId xmlns:a16="http://schemas.microsoft.com/office/drawing/2014/main" id="{75FD9405-FB38-D04B-A6B2-79C8CB074219}"/>
-              </a:ext>
-            </a:extLst>
-          </p:cNvPr>
-          <p:cNvSpPr txBox="1"/>
-          <p:nvPr/>
-        </p:nvSpPr>
-        <p:spPr>
-          <a:xfrm>
-            <a:off x="9646165" y="3838710"/>
-            <a:ext cx="2281176" cy="646331"/>
-          </a:xfrm>
-          <a:prstGeom prst="rect">
-            <a:avLst/>
-          </a:prstGeom>
-          <a:noFill/>
-        </p:spPr>
-        <p:txBody>
-          <a:bodyPr wrap="square" rtlCol="0">
-            <a:spAutoFit/>
-          </a:bodyPr>
-          <a:lstStyle/>
-          <a:p>
-            <a:r>
-              <a:rPr kumimoji="1" lang="en-US" altLang="ko-Kore-KR" dirty="0">
-                <a:latin typeface="Consolas" panose="020B0609020204030204" pitchFamily="49" charset="0"/>
-                <a:cs typeface="Consolas" panose="020B0609020204030204" pitchFamily="49" charset="0"/>
-              </a:rPr>
-              <a:t>Add this line in $HOME/.profile</a:t>
-            </a:r>
-            <a:endParaRPr kumimoji="1" lang="ko-Kore-KR" altLang="en-US" dirty="0">
-              <a:latin typeface="Consolas" panose="020B0609020204030204" pitchFamily="49" charset="0"/>
-              <a:cs typeface="Consolas" panose="020B0609020204030204" pitchFamily="49" charset="0"/>
-            </a:endParaRPr>
-          </a:p>
-        </p:txBody>
-      </p:sp>
-      <p:cxnSp>
-        <p:nvCxnSpPr>
-          <p:cNvPr id="7" name="직선 화살표 연결선 6">
-            <a:extLst>
-              <a:ext uri="{FF2B5EF4-FFF2-40B4-BE49-F238E27FC236}">
-                <a16:creationId xmlns:a16="http://schemas.microsoft.com/office/drawing/2014/main" id="{DC451362-92CD-FF44-9316-4F9A91CE6575}"/>
-              </a:ext>
-            </a:extLst>
-          </p:cNvPr>
-          <p:cNvCxnSpPr>
-            <a:cxnSpLocks/>
-          </p:cNvCxnSpPr>
-          <p:nvPr/>
-        </p:nvCxnSpPr>
-        <p:spPr>
-          <a:xfrm flipH="1">
-            <a:off x="9814460" y="4485041"/>
-            <a:ext cx="972293" cy="707402"/>
-          </a:xfrm>
-          <a:prstGeom prst="straightConnector1">
-            <a:avLst/>
-          </a:prstGeom>
-          <a:ln>
-            <a:tailEnd type="triangle"/>
-          </a:ln>
-        </p:spPr>
-        <p:style>
-          <a:lnRef idx="1">
-            <a:schemeClr val="accent1"/>
-          </a:lnRef>
-          <a:fillRef idx="0">
-            <a:schemeClr val="accent1"/>
-          </a:fillRef>
-          <a:effectRef idx="0">
-            <a:schemeClr val="accent1"/>
-          </a:effectRef>
-          <a:fontRef idx="minor">
-            <a:schemeClr val="tx1"/>
-          </a:fontRef>
-        </p:style>
-      </p:cxnSp>
     </p:spTree>
     <p:extLst>
       <p:ext uri="{BB962C8B-B14F-4D97-AF65-F5344CB8AC3E}">
-        <p14:creationId xmlns:p14="http://schemas.microsoft.com/office/powerpoint/2010/main" val="4070451159"/>
+        <p14:creationId xmlns:p14="http://schemas.microsoft.com/office/powerpoint/2010/main" val="1596961507"/>
       </p:ext>
     </p:extLst>
   </p:cSld>
@@ -4881,7 +7113,7 @@
           <p:cNvPr id="2" name="제목 1">
             <a:extLst>
               <a:ext uri="{FF2B5EF4-FFF2-40B4-BE49-F238E27FC236}">
-                <a16:creationId xmlns:a16="http://schemas.microsoft.com/office/drawing/2014/main" id="{7B784487-77DC-4D81-92E2-91E64A538BEC}"/>
+                <a16:creationId xmlns:a16="http://schemas.microsoft.com/office/drawing/2014/main" id="{DDAC8DF1-8C4A-4C5C-8FEA-35E979527464}"/>
               </a:ext>
             </a:extLst>
           </p:cNvPr>
@@ -4889,28 +7121,30 @@
             <a:spLocks noGrp="1"/>
           </p:cNvSpPr>
           <p:nvPr>
-            <p:ph type="title"/>
+            <p:ph type="ctrTitle"/>
           </p:nvPr>
         </p:nvSpPr>
         <p:spPr/>
         <p:txBody>
-          <a:bodyPr/>
-          <a:lstStyle/>
-          <a:p>
-            <a:r>
-              <a:rPr lang="en-US" altLang="ko-KR" dirty="0"/>
-              <a:t>Building K8s From Source - 5</a:t>
-            </a:r>
-            <a:endParaRPr lang="ko-KR" altLang="en-US" dirty="0"/>
-          </a:p>
-        </p:txBody>
-      </p:sp>
-      <p:sp>
-        <p:nvSpPr>
-          <p:cNvPr id="3" name="내용 개체 틀 2">
+          <a:bodyPr>
+            <a:normAutofit/>
+          </a:bodyPr>
+          <a:lstStyle/>
+          <a:p>
+            <a:r>
+              <a:rPr lang="en-US" altLang="ko-KR" sz="5800" dirty="0"/>
+              <a:t>Install Kubernetes</a:t>
+            </a:r>
+            <a:endParaRPr lang="ko-KR" altLang="en-US" sz="5800" dirty="0"/>
+          </a:p>
+        </p:txBody>
+      </p:sp>
+      <p:sp>
+        <p:nvSpPr>
+          <p:cNvPr id="3" name="부제목 2">
             <a:extLst>
               <a:ext uri="{FF2B5EF4-FFF2-40B4-BE49-F238E27FC236}">
-                <a16:creationId xmlns:a16="http://schemas.microsoft.com/office/drawing/2014/main" id="{68B6CABF-44E6-45BA-9FCD-7A2412C0EF20}"/>
+                <a16:creationId xmlns:a16="http://schemas.microsoft.com/office/drawing/2014/main" id="{E0645A0E-A623-47E1-BF34-1399FD3792F3}"/>
               </a:ext>
             </a:extLst>
           </p:cNvPr>
@@ -4918,106 +7152,22 @@
             <a:spLocks noGrp="1"/>
           </p:cNvSpPr>
           <p:nvPr>
-            <p:ph idx="1"/>
-          </p:nvPr>
-        </p:nvSpPr>
-        <p:spPr>
-          <a:xfrm>
-            <a:off x="1066800" y="2104289"/>
-            <a:ext cx="10058400" cy="4023360"/>
-          </a:xfrm>
-        </p:spPr>
-        <p:txBody>
-          <a:bodyPr>
-            <a:normAutofit/>
-          </a:bodyPr>
-          <a:lstStyle/>
-          <a:p>
-            <a:pPr marL="0" indent="0">
-              <a:buNone/>
-            </a:pPr>
-            <a:r>
-              <a:rPr lang="en-US" altLang="ko-KR" b="1" dirty="0"/>
-              <a:t>Start the cluster: </a:t>
-            </a:r>
-          </a:p>
-          <a:p>
-            <a:pPr marL="0" indent="0">
-              <a:buNone/>
-            </a:pPr>
-            <a:r>
-              <a:rPr lang="en-US" altLang="ko-KR" dirty="0">
-                <a:latin typeface="Consolas" panose="020B0609020204030204" pitchFamily="49" charset="0"/>
-                <a:cs typeface="Courier New" panose="02070309020205020404" pitchFamily="49" charset="0"/>
-              </a:rPr>
-              <a:t>  hack/local-up-</a:t>
-            </a:r>
-            <a:r>
-              <a:rPr lang="en-US" altLang="ko-KR" dirty="0" err="1">
-                <a:latin typeface="Consolas" panose="020B0609020204030204" pitchFamily="49" charset="0"/>
-                <a:cs typeface="Courier New" panose="02070309020205020404" pitchFamily="49" charset="0"/>
-              </a:rPr>
-              <a:t>cluster.sh</a:t>
-            </a:r>
-            <a:endParaRPr lang="en-US" altLang="ko-KR" dirty="0">
-              <a:latin typeface="Consolas" panose="020B0609020204030204" pitchFamily="49" charset="0"/>
-              <a:cs typeface="Courier New" panose="02070309020205020404" pitchFamily="49" charset="0"/>
-            </a:endParaRPr>
-          </a:p>
-          <a:p>
-            <a:pPr marL="0" indent="0">
-              <a:buNone/>
-            </a:pPr>
-            <a:endParaRPr lang="en-US" altLang="ko-KR" dirty="0">
-              <a:latin typeface="Consolas" panose="020B0609020204030204" pitchFamily="49" charset="0"/>
-              <a:cs typeface="Courier New" panose="02070309020205020404" pitchFamily="49" charset="0"/>
-            </a:endParaRPr>
-          </a:p>
-          <a:p>
-            <a:pPr marL="0" indent="0">
-              <a:buNone/>
-            </a:pPr>
-            <a:endParaRPr lang="en-US" altLang="ko-KR" dirty="0"/>
-          </a:p>
-          <a:p>
-            <a:endParaRPr lang="ko-KR" altLang="en-US" b="1" dirty="0"/>
-          </a:p>
-        </p:txBody>
-      </p:sp>
-      <p:pic>
-        <p:nvPicPr>
-          <p:cNvPr id="4" name="그림 3">
-            <a:extLst>
-              <a:ext uri="{FF2B5EF4-FFF2-40B4-BE49-F238E27FC236}">
-                <a16:creationId xmlns:a16="http://schemas.microsoft.com/office/drawing/2014/main" id="{69459A4C-0A46-1249-B3EE-61A448464BE1}"/>
-              </a:ext>
-            </a:extLst>
-          </p:cNvPr>
-          <p:cNvPicPr>
-            <a:picLocks noChangeAspect="1"/>
-          </p:cNvPicPr>
-          <p:nvPr/>
-        </p:nvPicPr>
-        <p:blipFill>
-          <a:blip r:embed="rId2"/>
-          <a:stretch>
-            <a:fillRect/>
-          </a:stretch>
-        </p:blipFill>
-        <p:spPr>
-          <a:xfrm>
-            <a:off x="2400300" y="3186157"/>
-            <a:ext cx="5876801" cy="2608333"/>
-          </a:xfrm>
-          <a:prstGeom prst="rect">
-            <a:avLst/>
-          </a:prstGeom>
-        </p:spPr>
-      </p:pic>
+            <p:ph type="subTitle" idx="1"/>
+          </p:nvPr>
+        </p:nvSpPr>
+        <p:spPr/>
+        <p:txBody>
+          <a:bodyPr/>
+          <a:lstStyle/>
+          <a:p>
+            <a:endParaRPr lang="ko-KR" altLang="en-US" dirty="0"/>
+          </a:p>
+        </p:txBody>
+      </p:sp>
     </p:spTree>
     <p:extLst>
       <p:ext uri="{BB962C8B-B14F-4D97-AF65-F5344CB8AC3E}">
-        <p14:creationId xmlns:p14="http://schemas.microsoft.com/office/powerpoint/2010/main" val="2954992337"/>
+        <p14:creationId xmlns:p14="http://schemas.microsoft.com/office/powerpoint/2010/main" val="2399794971"/>
       </p:ext>
     </p:extLst>
   </p:cSld>
@@ -5067,7 +7217,7 @@
           <a:p>
             <a:r>
               <a:rPr lang="en-US" altLang="ko-KR" dirty="0"/>
-              <a:t>Building K8s From Source - 6</a:t>
+              <a:t>Prerequisite</a:t>
             </a:r>
             <a:endParaRPr lang="ko-KR" altLang="en-US" dirty="0"/>
           </a:p>
@@ -5091,6 +7241,432 @@
         </p:nvSpPr>
         <p:spPr>
           <a:xfrm>
+            <a:off x="1097280" y="1864653"/>
+            <a:ext cx="10058400" cy="4023360"/>
+          </a:xfrm>
+        </p:spPr>
+        <p:txBody>
+          <a:bodyPr>
+            <a:normAutofit/>
+          </a:bodyPr>
+          <a:lstStyle/>
+          <a:p>
+            <a:pPr>
+              <a:lnSpc>
+                <a:spcPct val="150000"/>
+              </a:lnSpc>
+            </a:pPr>
+            <a:r>
+              <a:rPr lang="en-US" altLang="ko-KR" sz="2800" dirty="0"/>
+              <a:t>- An ubuntu slave server (version 18.04+)</a:t>
+            </a:r>
+          </a:p>
+          <a:p>
+            <a:pPr>
+              <a:lnSpc>
+                <a:spcPct val="150000"/>
+              </a:lnSpc>
+            </a:pPr>
+            <a:r>
+              <a:rPr lang="en-US" altLang="ko-KR" sz="2800" dirty="0"/>
+              <a:t>- More than 2GB of memory</a:t>
+            </a:r>
+          </a:p>
+          <a:p>
+            <a:pPr>
+              <a:lnSpc>
+                <a:spcPct val="150000"/>
+              </a:lnSpc>
+            </a:pPr>
+            <a:r>
+              <a:rPr lang="en-US" altLang="ko-KR" sz="2800" dirty="0"/>
+              <a:t>- 40GB of free space</a:t>
+            </a:r>
+          </a:p>
+          <a:p>
+            <a:pPr marL="0" indent="0">
+              <a:lnSpc>
+                <a:spcPct val="150000"/>
+              </a:lnSpc>
+              <a:buNone/>
+            </a:pPr>
+            <a:endParaRPr lang="en-US" altLang="ko-KR" sz="2800" dirty="0"/>
+          </a:p>
+          <a:p>
+            <a:pPr>
+              <a:lnSpc>
+                <a:spcPct val="150000"/>
+              </a:lnSpc>
+            </a:pPr>
+            <a:endParaRPr lang="ko-KR" altLang="en-US" sz="2800" dirty="0"/>
+          </a:p>
+        </p:txBody>
+      </p:sp>
+    </p:spTree>
+    <p:extLst>
+      <p:ext uri="{BB962C8B-B14F-4D97-AF65-F5344CB8AC3E}">
+        <p14:creationId xmlns:p14="http://schemas.microsoft.com/office/powerpoint/2010/main" val="4147602371"/>
+      </p:ext>
+    </p:extLst>
+  </p:cSld>
+  <p:clrMapOvr>
+    <a:masterClrMapping/>
+  </p:clrMapOvr>
+</p:sld>
+</file>
+
+<file path=ppt/slides/slide8.xml><?xml version="1.0" encoding="utf-8"?>
+<p:sld xmlns:a="http://schemas.openxmlformats.org/drawingml/2006/main" xmlns:r="http://schemas.openxmlformats.org/officeDocument/2006/relationships" xmlns:p="http://schemas.openxmlformats.org/presentationml/2006/main">
+  <p:cSld>
+    <p:spTree>
+      <p:nvGrpSpPr>
+        <p:cNvPr id="1" name=""/>
+        <p:cNvGrpSpPr/>
+        <p:nvPr/>
+      </p:nvGrpSpPr>
+      <p:grpSpPr>
+        <a:xfrm>
+          <a:off x="0" y="0"/>
+          <a:ext cx="0" cy="0"/>
+          <a:chOff x="0" y="0"/>
+          <a:chExt cx="0" cy="0"/>
+        </a:xfrm>
+      </p:grpSpPr>
+      <p:sp>
+        <p:nvSpPr>
+          <p:cNvPr id="2" name="제목 1">
+            <a:extLst>
+              <a:ext uri="{FF2B5EF4-FFF2-40B4-BE49-F238E27FC236}">
+                <a16:creationId xmlns:a16="http://schemas.microsoft.com/office/drawing/2014/main" id="{7B784487-77DC-4D81-92E2-91E64A538BEC}"/>
+              </a:ext>
+            </a:extLst>
+          </p:cNvPr>
+          <p:cNvSpPr>
+            <a:spLocks noGrp="1"/>
+          </p:cNvSpPr>
+          <p:nvPr>
+            <p:ph type="title"/>
+          </p:nvPr>
+        </p:nvSpPr>
+        <p:spPr/>
+        <p:txBody>
+          <a:bodyPr/>
+          <a:lstStyle/>
+          <a:p>
+            <a:r>
+              <a:rPr lang="en-US" altLang="ko-KR" dirty="0"/>
+              <a:t>Install K8s - 1</a:t>
+            </a:r>
+            <a:endParaRPr lang="ko-KR" altLang="en-US" dirty="0"/>
+          </a:p>
+        </p:txBody>
+      </p:sp>
+      <p:sp>
+        <p:nvSpPr>
+          <p:cNvPr id="3" name="내용 개체 틀 2">
+            <a:extLst>
+              <a:ext uri="{FF2B5EF4-FFF2-40B4-BE49-F238E27FC236}">
+                <a16:creationId xmlns:a16="http://schemas.microsoft.com/office/drawing/2014/main" id="{68B6CABF-44E6-45BA-9FCD-7A2412C0EF20}"/>
+              </a:ext>
+            </a:extLst>
+          </p:cNvPr>
+          <p:cNvSpPr>
+            <a:spLocks noGrp="1"/>
+          </p:cNvSpPr>
+          <p:nvPr>
+            <p:ph idx="1"/>
+          </p:nvPr>
+        </p:nvSpPr>
+        <p:spPr>
+          <a:xfrm>
+            <a:off x="1009403" y="2104289"/>
+            <a:ext cx="11930743" cy="4023360"/>
+          </a:xfrm>
+        </p:spPr>
+        <p:txBody>
+          <a:bodyPr>
+            <a:normAutofit/>
+          </a:bodyPr>
+          <a:lstStyle/>
+          <a:p>
+            <a:pPr>
+              <a:lnSpc>
+                <a:spcPct val="150000"/>
+              </a:lnSpc>
+            </a:pPr>
+            <a:r>
+              <a:rPr lang="en-US" altLang="ko-KR" sz="3200" dirty="0"/>
+              <a:t>- Install Docker on both master / slave node(Slide 3)</a:t>
+            </a:r>
+          </a:p>
+          <a:p>
+            <a:pPr>
+              <a:lnSpc>
+                <a:spcPct val="150000"/>
+              </a:lnSpc>
+            </a:pPr>
+            <a:r>
+              <a:rPr lang="en-US" altLang="ko-KR" sz="3200" dirty="0"/>
+              <a:t>- Install </a:t>
+            </a:r>
+            <a:r>
+              <a:rPr lang="en-US" altLang="ko-KR" sz="3200" dirty="0" err="1"/>
+              <a:t>Kubeadm</a:t>
+            </a:r>
+            <a:r>
+              <a:rPr lang="en-US" altLang="ko-KR" sz="3200" dirty="0"/>
+              <a:t> on both nodes</a:t>
+            </a:r>
+          </a:p>
+          <a:p>
+            <a:pPr>
+              <a:lnSpc>
+                <a:spcPct val="150000"/>
+              </a:lnSpc>
+            </a:pPr>
+            <a:r>
+              <a:rPr lang="en-US" altLang="ko-KR" sz="1600" dirty="0">
+                <a:latin typeface="Consolas" panose="020B0609020204030204" pitchFamily="49" charset="0"/>
+                <a:cs typeface="Courier New" panose="02070309020205020404" pitchFamily="49" charset="0"/>
+              </a:rPr>
+              <a:t> </a:t>
+            </a:r>
+            <a:r>
+              <a:rPr lang="en-US" altLang="ko-KR" sz="1800" dirty="0">
+                <a:latin typeface="Consolas" panose="020B0609020204030204" pitchFamily="49" charset="0"/>
+                <a:cs typeface="Consolas" panose="020B0609020204030204" pitchFamily="49" charset="0"/>
+              </a:rPr>
+              <a:t>curl </a:t>
+            </a:r>
+            <a:r>
+              <a:rPr lang="en-US" altLang="ko-Kore-KR" sz="1800" dirty="0">
+                <a:latin typeface="Consolas" panose="020B0609020204030204" pitchFamily="49" charset="0"/>
+                <a:cs typeface="Consolas" panose="020B0609020204030204" pitchFamily="49" charset="0"/>
+              </a:rPr>
+              <a:t>-s https://</a:t>
+            </a:r>
+            <a:r>
+              <a:rPr lang="en-US" altLang="ko-Kore-KR" sz="1800" dirty="0" err="1">
+                <a:latin typeface="Consolas" panose="020B0609020204030204" pitchFamily="49" charset="0"/>
+                <a:cs typeface="Consolas" panose="020B0609020204030204" pitchFamily="49" charset="0"/>
+              </a:rPr>
+              <a:t>packages.cloud.google.com</a:t>
+            </a:r>
+            <a:r>
+              <a:rPr lang="en-US" altLang="ko-Kore-KR" sz="1800" dirty="0">
+                <a:latin typeface="Consolas" panose="020B0609020204030204" pitchFamily="49" charset="0"/>
+                <a:cs typeface="Consolas" panose="020B0609020204030204" pitchFamily="49" charset="0"/>
+              </a:rPr>
+              <a:t>/apt/doc/apt-</a:t>
+            </a:r>
+            <a:r>
+              <a:rPr lang="en-US" altLang="ko-Kore-KR" sz="1800" dirty="0" err="1">
+                <a:latin typeface="Consolas" panose="020B0609020204030204" pitchFamily="49" charset="0"/>
+                <a:cs typeface="Consolas" panose="020B0609020204030204" pitchFamily="49" charset="0"/>
+              </a:rPr>
+              <a:t>key.gpg</a:t>
+            </a:r>
+            <a:r>
+              <a:rPr lang="en-US" altLang="ko-Kore-KR" sz="1800" dirty="0">
+                <a:latin typeface="Consolas" panose="020B0609020204030204" pitchFamily="49" charset="0"/>
+                <a:cs typeface="Consolas" panose="020B0609020204030204" pitchFamily="49" charset="0"/>
+              </a:rPr>
+              <a:t> | </a:t>
+            </a:r>
+            <a:r>
+              <a:rPr lang="en-US" altLang="ko-Kore-KR" sz="1800" dirty="0" err="1">
+                <a:latin typeface="Consolas" panose="020B0609020204030204" pitchFamily="49" charset="0"/>
+                <a:cs typeface="Consolas" panose="020B0609020204030204" pitchFamily="49" charset="0"/>
+              </a:rPr>
+              <a:t>sudo</a:t>
+            </a:r>
+            <a:r>
+              <a:rPr lang="en-US" altLang="ko-Kore-KR" sz="1800" dirty="0">
+                <a:latin typeface="Consolas" panose="020B0609020204030204" pitchFamily="49" charset="0"/>
+                <a:cs typeface="Consolas" panose="020B0609020204030204" pitchFamily="49" charset="0"/>
+              </a:rPr>
+              <a:t> apt-key add</a:t>
+            </a:r>
+            <a:endParaRPr lang="en-US" altLang="ko-KR" sz="1800" dirty="0">
+              <a:latin typeface="Consolas" panose="020B0609020204030204" pitchFamily="49" charset="0"/>
+              <a:cs typeface="Consolas" panose="020B0609020204030204" pitchFamily="49" charset="0"/>
+            </a:endParaRPr>
+          </a:p>
+          <a:p>
+            <a:pPr>
+              <a:lnSpc>
+                <a:spcPct val="150000"/>
+              </a:lnSpc>
+            </a:pPr>
+            <a:r>
+              <a:rPr lang="en-US" altLang="ko-KR" sz="1800" dirty="0">
+                <a:latin typeface="Consolas" panose="020B0609020204030204" pitchFamily="49" charset="0"/>
+                <a:cs typeface="Consolas" panose="020B0609020204030204" pitchFamily="49" charset="0"/>
+              </a:rPr>
+              <a:t> </a:t>
+            </a:r>
+            <a:r>
+              <a:rPr lang="en-US" altLang="ko-Kore-KR" sz="1800" dirty="0" err="1">
+                <a:latin typeface="Consolas" panose="020B0609020204030204" pitchFamily="49" charset="0"/>
+                <a:cs typeface="Consolas" panose="020B0609020204030204" pitchFamily="49" charset="0"/>
+              </a:rPr>
+              <a:t>sudo</a:t>
+            </a:r>
+            <a:r>
+              <a:rPr lang="en-US" altLang="ko-Kore-KR" sz="1800" dirty="0">
+                <a:latin typeface="Consolas" panose="020B0609020204030204" pitchFamily="49" charset="0"/>
+                <a:cs typeface="Consolas" panose="020B0609020204030204" pitchFamily="49" charset="0"/>
+              </a:rPr>
+              <a:t> apt-add-repository "deb </a:t>
+            </a:r>
+            <a:r>
+              <a:rPr lang="en-US" altLang="ko-Kore-KR" sz="1800" dirty="0">
+                <a:latin typeface="Consolas" panose="020B0609020204030204" pitchFamily="49" charset="0"/>
+                <a:cs typeface="Consolas" panose="020B0609020204030204" pitchFamily="49" charset="0"/>
+                <a:hlinkClick r:id="rId2"/>
+              </a:rPr>
+              <a:t>http://apt.kubernetes.io</a:t>
+            </a:r>
+            <a:r>
+              <a:rPr lang="en-US" altLang="ko-Kore-KR" sz="1800" dirty="0">
+                <a:latin typeface="Consolas" panose="020B0609020204030204" pitchFamily="49" charset="0"/>
+                <a:cs typeface="Consolas" panose="020B0609020204030204" pitchFamily="49" charset="0"/>
+              </a:rPr>
+              <a:t>/</a:t>
+            </a:r>
+            <a:r>
+              <a:rPr lang="en-US" altLang="ko-Kore-KR" sz="1800" dirty="0" err="1">
+                <a:latin typeface="Consolas" panose="020B0609020204030204" pitchFamily="49" charset="0"/>
+                <a:cs typeface="Consolas" panose="020B0609020204030204" pitchFamily="49" charset="0"/>
+              </a:rPr>
+              <a:t>kubernetes-xenial</a:t>
+            </a:r>
+            <a:r>
+              <a:rPr lang="en-US" altLang="ko-Kore-KR" sz="1800" dirty="0">
+                <a:latin typeface="Consolas" panose="020B0609020204030204" pitchFamily="49" charset="0"/>
+                <a:cs typeface="Consolas" panose="020B0609020204030204" pitchFamily="49" charset="0"/>
+              </a:rPr>
+              <a:t> main”</a:t>
+            </a:r>
+          </a:p>
+          <a:p>
+            <a:pPr>
+              <a:lnSpc>
+                <a:spcPct val="150000"/>
+              </a:lnSpc>
+            </a:pPr>
+            <a:r>
+              <a:rPr lang="en-US" altLang="ko-KR" sz="1800" dirty="0">
+                <a:latin typeface="Consolas" panose="020B0609020204030204" pitchFamily="49" charset="0"/>
+                <a:cs typeface="Consolas" panose="020B0609020204030204" pitchFamily="49" charset="0"/>
+              </a:rPr>
+              <a:t> </a:t>
+            </a:r>
+            <a:r>
+              <a:rPr lang="en-US" altLang="ko-Kore-KR" sz="1800" dirty="0" err="1">
+                <a:latin typeface="Consolas" panose="020B0609020204030204" pitchFamily="49" charset="0"/>
+                <a:cs typeface="Consolas" panose="020B0609020204030204" pitchFamily="49" charset="0"/>
+              </a:rPr>
+              <a:t>sudo</a:t>
+            </a:r>
+            <a:r>
+              <a:rPr lang="en-US" altLang="ko-Kore-KR" sz="1800" dirty="0">
+                <a:latin typeface="Consolas" panose="020B0609020204030204" pitchFamily="49" charset="0"/>
+                <a:cs typeface="Consolas" panose="020B0609020204030204" pitchFamily="49" charset="0"/>
+              </a:rPr>
+              <a:t> apt install </a:t>
+            </a:r>
+            <a:r>
+              <a:rPr lang="en-US" altLang="ko-Kore-KR" sz="1800" dirty="0" err="1">
+                <a:latin typeface="Consolas" panose="020B0609020204030204" pitchFamily="49" charset="0"/>
+                <a:cs typeface="Consolas" panose="020B0609020204030204" pitchFamily="49" charset="0"/>
+              </a:rPr>
+              <a:t>kubeadm</a:t>
+            </a:r>
+            <a:endParaRPr lang="en-US" altLang="ko-KR" sz="1800" b="1" dirty="0">
+              <a:latin typeface="Consolas" panose="020B0609020204030204" pitchFamily="49" charset="0"/>
+              <a:cs typeface="Consolas" panose="020B0609020204030204" pitchFamily="49" charset="0"/>
+            </a:endParaRPr>
+          </a:p>
+        </p:txBody>
+      </p:sp>
+    </p:spTree>
+    <p:extLst>
+      <p:ext uri="{BB962C8B-B14F-4D97-AF65-F5344CB8AC3E}">
+        <p14:creationId xmlns:p14="http://schemas.microsoft.com/office/powerpoint/2010/main" val="2155044027"/>
+      </p:ext>
+    </p:extLst>
+  </p:cSld>
+  <p:clrMapOvr>
+    <a:masterClrMapping/>
+  </p:clrMapOvr>
+</p:sld>
+</file>
+
+<file path=ppt/slides/slide9.xml><?xml version="1.0" encoding="utf-8"?>
+<p:sld xmlns:a="http://schemas.openxmlformats.org/drawingml/2006/main" xmlns:r="http://schemas.openxmlformats.org/officeDocument/2006/relationships" xmlns:p="http://schemas.openxmlformats.org/presentationml/2006/main">
+  <p:cSld>
+    <p:spTree>
+      <p:nvGrpSpPr>
+        <p:cNvPr id="1" name=""/>
+        <p:cNvGrpSpPr/>
+        <p:nvPr/>
+      </p:nvGrpSpPr>
+      <p:grpSpPr>
+        <a:xfrm>
+          <a:off x="0" y="0"/>
+          <a:ext cx="0" cy="0"/>
+          <a:chOff x="0" y="0"/>
+          <a:chExt cx="0" cy="0"/>
+        </a:xfrm>
+      </p:grpSpPr>
+      <p:sp>
+        <p:nvSpPr>
+          <p:cNvPr id="2" name="제목 1">
+            <a:extLst>
+              <a:ext uri="{FF2B5EF4-FFF2-40B4-BE49-F238E27FC236}">
+                <a16:creationId xmlns:a16="http://schemas.microsoft.com/office/drawing/2014/main" id="{7B784487-77DC-4D81-92E2-91E64A538BEC}"/>
+              </a:ext>
+            </a:extLst>
+          </p:cNvPr>
+          <p:cNvSpPr>
+            <a:spLocks noGrp="1"/>
+          </p:cNvSpPr>
+          <p:nvPr>
+            <p:ph type="title"/>
+          </p:nvPr>
+        </p:nvSpPr>
+        <p:spPr/>
+        <p:txBody>
+          <a:bodyPr/>
+          <a:lstStyle/>
+          <a:p>
+            <a:r>
+              <a:rPr lang="en-US" altLang="ko-KR" dirty="0"/>
+              <a:t>Install K8s - 2</a:t>
+            </a:r>
+            <a:endParaRPr lang="ko-KR" altLang="en-US" dirty="0"/>
+          </a:p>
+        </p:txBody>
+      </p:sp>
+      <p:sp>
+        <p:nvSpPr>
+          <p:cNvPr id="3" name="내용 개체 틀 2">
+            <a:extLst>
+              <a:ext uri="{FF2B5EF4-FFF2-40B4-BE49-F238E27FC236}">
+                <a16:creationId xmlns:a16="http://schemas.microsoft.com/office/drawing/2014/main" id="{68B6CABF-44E6-45BA-9FCD-7A2412C0EF20}"/>
+              </a:ext>
+            </a:extLst>
+          </p:cNvPr>
+          <p:cNvSpPr>
+            <a:spLocks noGrp="1"/>
+          </p:cNvSpPr>
+          <p:nvPr>
+            <p:ph idx="1"/>
+          </p:nvPr>
+        </p:nvSpPr>
+        <p:spPr>
+          <a:xfrm>
             <a:off x="1066800" y="2104289"/>
             <a:ext cx="10058400" cy="4023360"/>
           </a:xfrm>
@@ -5101,106 +7677,186 @@
           </a:bodyPr>
           <a:lstStyle/>
           <a:p>
-            <a:pPr marL="0" indent="0">
-              <a:buNone/>
+            <a:pPr>
+              <a:lnSpc>
+                <a:spcPct val="100000"/>
+              </a:lnSpc>
             </a:pPr>
             <a:r>
-              <a:rPr lang="en-US" altLang="ko-KR" b="1" dirty="0"/>
+              <a:rPr lang="en-US" altLang="ko-KR" sz="3200" dirty="0"/>
+              <a:t>- Disable swap memory on both nodes</a:t>
+            </a:r>
+          </a:p>
+          <a:p>
+            <a:pPr>
+              <a:lnSpc>
+                <a:spcPct val="100000"/>
+              </a:lnSpc>
+            </a:pPr>
+            <a:r>
+              <a:rPr lang="en-US" altLang="ko-KR" sz="3200" dirty="0">
+                <a:latin typeface="Consolas" panose="020B0609020204030204" pitchFamily="49" charset="0"/>
+                <a:cs typeface="Courier New" panose="02070309020205020404" pitchFamily="49" charset="0"/>
+              </a:rPr>
               <a:t> </a:t>
             </a:r>
             <a:r>
+              <a:rPr lang="en-US" altLang="ko-KR" dirty="0" err="1">
+                <a:latin typeface="Consolas" panose="020B0609020204030204" pitchFamily="49" charset="0"/>
+                <a:cs typeface="Courier New" panose="02070309020205020404" pitchFamily="49" charset="0"/>
+              </a:rPr>
+              <a:t>sudo</a:t>
+            </a:r>
+            <a:r>
+              <a:rPr lang="en-US" altLang="ko-KR" dirty="0">
+                <a:latin typeface="Consolas" panose="020B0609020204030204" pitchFamily="49" charset="0"/>
+                <a:cs typeface="Courier New" panose="02070309020205020404" pitchFamily="49" charset="0"/>
+              </a:rPr>
+              <a:t> </a:t>
+            </a:r>
+            <a:r>
+              <a:rPr lang="en-US" altLang="ko-KR" dirty="0" err="1">
+                <a:latin typeface="Consolas" panose="020B0609020204030204" pitchFamily="49" charset="0"/>
+                <a:cs typeface="Courier New" panose="02070309020205020404" pitchFamily="49" charset="0"/>
+              </a:rPr>
+              <a:t>swapoff</a:t>
+            </a:r>
+            <a:r>
+              <a:rPr lang="en-US" altLang="ko-KR" dirty="0">
+                <a:latin typeface="Consolas" panose="020B0609020204030204" pitchFamily="49" charset="0"/>
+                <a:cs typeface="Courier New" panose="02070309020205020404" pitchFamily="49" charset="0"/>
+              </a:rPr>
+              <a:t> -a</a:t>
+            </a:r>
+            <a:endParaRPr lang="en-US" altLang="ko-KR" dirty="0"/>
+          </a:p>
+          <a:p>
+            <a:pPr>
+              <a:lnSpc>
+                <a:spcPct val="150000"/>
+              </a:lnSpc>
+            </a:pPr>
+            <a:r>
+              <a:rPr lang="en-US" altLang="ko-KR" sz="3200" dirty="0"/>
+              <a:t>- Set Hostnames for both nodes</a:t>
+            </a:r>
+          </a:p>
+          <a:p>
+            <a:pPr>
+              <a:lnSpc>
+                <a:spcPct val="150000"/>
+              </a:lnSpc>
+            </a:pPr>
+            <a:r>
+              <a:rPr lang="en-US" altLang="ko-KR" dirty="0">
+                <a:latin typeface="Consolas" panose="020B0609020204030204" pitchFamily="49" charset="0"/>
+                <a:cs typeface="Courier New" panose="02070309020205020404" pitchFamily="49" charset="0"/>
+              </a:rPr>
+              <a:t>  </a:t>
+            </a:r>
+            <a:r>
               <a:rPr lang="en-US" altLang="ko-KR" b="1" dirty="0">
                 <a:latin typeface="Consolas" panose="020B0609020204030204" pitchFamily="49" charset="0"/>
                 <a:cs typeface="Courier New" panose="02070309020205020404" pitchFamily="49" charset="0"/>
               </a:rPr>
-              <a:t>In a new shell, in the </a:t>
-            </a:r>
-            <a:r>
-              <a:rPr lang="en-US" altLang="ko-KR" b="1" dirty="0" err="1">
+              <a:t>(master node) </a:t>
+            </a:r>
+            <a:r>
+              <a:rPr lang="en-US" altLang="ko-KR" dirty="0" err="1">
                 <a:latin typeface="Consolas" panose="020B0609020204030204" pitchFamily="49" charset="0"/>
                 <a:cs typeface="Courier New" panose="02070309020205020404" pitchFamily="49" charset="0"/>
               </a:rPr>
-              <a:t>kubernetes</a:t>
+              <a:t>sudo</a:t>
+            </a:r>
+            <a:r>
+              <a:rPr lang="en-US" altLang="ko-KR" dirty="0">
+                <a:latin typeface="Consolas" panose="020B0609020204030204" pitchFamily="49" charset="0"/>
+                <a:cs typeface="Courier New" panose="02070309020205020404" pitchFamily="49" charset="0"/>
+              </a:rPr>
+              <a:t> </a:t>
+            </a:r>
+            <a:r>
+              <a:rPr lang="en-US" altLang="ko-KR" dirty="0" err="1">
+                <a:latin typeface="Consolas" panose="020B0609020204030204" pitchFamily="49" charset="0"/>
+                <a:cs typeface="Courier New" panose="02070309020205020404" pitchFamily="49" charset="0"/>
+              </a:rPr>
+              <a:t>hostnamectl</a:t>
+            </a:r>
+            <a:r>
+              <a:rPr lang="en-US" altLang="ko-KR" dirty="0">
+                <a:latin typeface="Consolas" panose="020B0609020204030204" pitchFamily="49" charset="0"/>
+                <a:cs typeface="Courier New" panose="02070309020205020404" pitchFamily="49" charset="0"/>
+              </a:rPr>
+              <a:t> set-hostname master-node</a:t>
+            </a:r>
+          </a:p>
+          <a:p>
+            <a:pPr>
+              <a:lnSpc>
+                <a:spcPct val="150000"/>
+              </a:lnSpc>
+            </a:pPr>
+            <a:r>
+              <a:rPr lang="en-US" altLang="ko-KR" dirty="0">
+                <a:latin typeface="Consolas" panose="020B0609020204030204" pitchFamily="49" charset="0"/>
+                <a:cs typeface="Courier New" panose="02070309020205020404" pitchFamily="49" charset="0"/>
+              </a:rPr>
+              <a:t>  </a:t>
             </a:r>
             <a:r>
               <a:rPr lang="en-US" altLang="ko-KR" b="1" dirty="0">
                 <a:latin typeface="Consolas" panose="020B0609020204030204" pitchFamily="49" charset="0"/>
                 <a:cs typeface="Courier New" panose="02070309020205020404" pitchFamily="49" charset="0"/>
               </a:rPr>
-              <a:t> directory:</a:t>
-            </a:r>
-          </a:p>
-          <a:p>
-            <a:pPr marL="0" indent="0">
-              <a:buNone/>
+              <a:t>(slave node) </a:t>
+            </a:r>
+            <a:r>
+              <a:rPr lang="en-US" altLang="ko-KR" dirty="0" err="1">
+                <a:latin typeface="Consolas" panose="020B0609020204030204" pitchFamily="49" charset="0"/>
+                <a:cs typeface="Courier New" panose="02070309020205020404" pitchFamily="49" charset="0"/>
+              </a:rPr>
+              <a:t>sudo</a:t>
+            </a:r>
+            <a:r>
+              <a:rPr lang="en-US" altLang="ko-KR" dirty="0">
+                <a:latin typeface="Consolas" panose="020B0609020204030204" pitchFamily="49" charset="0"/>
+                <a:cs typeface="Courier New" panose="02070309020205020404" pitchFamily="49" charset="0"/>
+              </a:rPr>
+              <a:t> </a:t>
+            </a:r>
+            <a:r>
+              <a:rPr lang="en-US" altLang="ko-KR" dirty="0" err="1">
+                <a:latin typeface="Consolas" panose="020B0609020204030204" pitchFamily="49" charset="0"/>
+                <a:cs typeface="Courier New" panose="02070309020205020404" pitchFamily="49" charset="0"/>
+              </a:rPr>
+              <a:t>hostnamectl</a:t>
+            </a:r>
+            <a:r>
+              <a:rPr lang="en-US" altLang="ko-KR" dirty="0">
+                <a:latin typeface="Consolas" panose="020B0609020204030204" pitchFamily="49" charset="0"/>
+                <a:cs typeface="Courier New" panose="02070309020205020404" pitchFamily="49" charset="0"/>
+              </a:rPr>
+              <a:t> set-hostname slave-node</a:t>
+            </a:r>
+            <a:endParaRPr lang="en-US" altLang="ko-KR" dirty="0"/>
+          </a:p>
+          <a:p>
+            <a:pPr>
+              <a:lnSpc>
+                <a:spcPct val="150000"/>
+              </a:lnSpc>
             </a:pPr>
-            <a:r>
-              <a:rPr lang="en-US" altLang="ko-KR" dirty="0">
-                <a:latin typeface="Consolas" panose="020B0609020204030204" pitchFamily="49" charset="0"/>
-                <a:cs typeface="Courier New" panose="02070309020205020404" pitchFamily="49" charset="0"/>
-              </a:rPr>
-              <a:t>  cluster/</a:t>
-            </a:r>
-            <a:r>
-              <a:rPr lang="en-US" altLang="ko-KR" dirty="0" err="1">
-                <a:latin typeface="Consolas" panose="020B0609020204030204" pitchFamily="49" charset="0"/>
-                <a:cs typeface="Courier New" panose="02070309020205020404" pitchFamily="49" charset="0"/>
-              </a:rPr>
-              <a:t>kubectl.sh</a:t>
-            </a:r>
-            <a:r>
-              <a:rPr lang="en-US" altLang="ko-KR" dirty="0">
-                <a:latin typeface="Consolas" panose="020B0609020204030204" pitchFamily="49" charset="0"/>
-                <a:cs typeface="Courier New" panose="02070309020205020404" pitchFamily="49" charset="0"/>
-              </a:rPr>
-              <a:t> cluster-info</a:t>
-            </a:r>
-          </a:p>
-          <a:p>
-            <a:pPr marL="0" indent="0">
-              <a:buNone/>
-            </a:pPr>
-            <a:endParaRPr lang="en-US" altLang="ko-KR" dirty="0"/>
-          </a:p>
-          <a:p>
-            <a:endParaRPr lang="ko-KR" altLang="en-US" b="1" dirty="0"/>
-          </a:p>
-        </p:txBody>
-      </p:sp>
-      <p:pic>
-        <p:nvPicPr>
-          <p:cNvPr id="5" name="그림 4">
-            <a:extLst>
-              <a:ext uri="{FF2B5EF4-FFF2-40B4-BE49-F238E27FC236}">
-                <a16:creationId xmlns:a16="http://schemas.microsoft.com/office/drawing/2014/main" id="{D0BC12F3-97A8-294D-A539-F65B84698CB7}"/>
-              </a:ext>
-            </a:extLst>
-          </p:cNvPr>
-          <p:cNvPicPr>
-            <a:picLocks noChangeAspect="1"/>
-          </p:cNvPicPr>
-          <p:nvPr/>
-        </p:nvPicPr>
-        <p:blipFill>
-          <a:blip r:embed="rId2"/>
-          <a:stretch>
-            <a:fillRect/>
-          </a:stretch>
-        </p:blipFill>
-        <p:spPr>
-          <a:xfrm>
-            <a:off x="1517650" y="3581400"/>
-            <a:ext cx="9156700" cy="1409700"/>
-          </a:xfrm>
-          <a:prstGeom prst="rect">
-            <a:avLst/>
-          </a:prstGeom>
-        </p:spPr>
-      </p:pic>
+            <a:endParaRPr lang="en-US" altLang="ko-KR" sz="1600" b="1" dirty="0">
+              <a:latin typeface="Consolas" panose="020B0609020204030204" pitchFamily="49" charset="0"/>
+              <a:cs typeface="Consolas" panose="020B0609020204030204" pitchFamily="49" charset="0"/>
+            </a:endParaRPr>
+          </a:p>
+        </p:txBody>
+      </p:sp>
     </p:spTree>
     <p:extLst>
       <p:ext uri="{BB962C8B-B14F-4D97-AF65-F5344CB8AC3E}">
-        <p14:creationId xmlns:p14="http://schemas.microsoft.com/office/powerpoint/2010/main" val="1142522244"/>
+        <p14:creationId xmlns:p14="http://schemas.microsoft.com/office/powerpoint/2010/main" val="2418989940"/>
       </p:ext>
     </p:extLst>
   </p:cSld>

</xml_diff>

<commit_message>
[Fix] Sudo for commands
</commit_message>
<xml_diff>
--- a/docs/Building Kubernetes From Source.pptx
+++ b/docs/Building Kubernetes From Source.pptx
@@ -3987,7 +3987,7 @@
             </a:pPr>
             <a:r>
               <a:rPr lang="en-US" altLang="ko-KR" sz="3200" dirty="0"/>
-              <a:t>- Initialize Kubernetes on master node</a:t>
+              <a:t>- Initialize Kubernetes on master node as root</a:t>
             </a:r>
           </a:p>
           <a:p>
@@ -3997,28 +3997,14 @@
               </a:lnSpc>
             </a:pPr>
             <a:r>
-              <a:rPr lang="en-US" altLang="ko-KR" sz="3200" dirty="0">
+              <a:rPr lang="en-US" altLang="ko-KR" sz="3200">
                 <a:latin typeface="Consolas" panose="020B0609020204030204" pitchFamily="49" charset="0"/>
                 <a:cs typeface="Consolas" panose="020B0609020204030204" pitchFamily="49" charset="0"/>
               </a:rPr>
               <a:t> </a:t>
             </a:r>
             <a:r>
-              <a:rPr lang="en-US" altLang="ko-Kore-KR" dirty="0" err="1">
-                <a:latin typeface="Consolas" panose="020B0609020204030204" pitchFamily="49" charset="0"/>
-                <a:cs typeface="Consolas" panose="020B0609020204030204" pitchFamily="49" charset="0"/>
-              </a:rPr>
-              <a:t>sudo</a:t>
-            </a:r>
-            <a:r>
-              <a:rPr lang="en-US" altLang="ko-Kore-KR" dirty="0">
-                <a:latin typeface="Consolas" panose="020B0609020204030204" pitchFamily="49" charset="0"/>
-                <a:cs typeface="Consolas" panose="020B0609020204030204" pitchFamily="49" charset="0"/>
-              </a:rPr>
-              <a:t> </a:t>
-            </a:r>
-            <a:r>
-              <a:rPr lang="en-US" altLang="ko-Kore-KR" dirty="0" err="1">
+              <a:rPr lang="en-US" altLang="ko-Kore-KR">
                 <a:latin typeface="Consolas" panose="020B0609020204030204" pitchFamily="49" charset="0"/>
                 <a:cs typeface="Consolas" panose="020B0609020204030204" pitchFamily="49" charset="0"/>
               </a:rPr>
@@ -7557,14 +7543,14 @@
                 <a:cs typeface="Consolas" panose="020B0609020204030204" pitchFamily="49" charset="0"/>
                 <a:hlinkClick r:id="rId2"/>
               </a:rPr>
-              <a:t>http://apt.kubernetes.io</a:t>
+              <a:t>https://apt.kubernetes.io/</a:t>
             </a:r>
             <a:r>
               <a:rPr lang="en-US" altLang="ko-Kore-KR" sz="1800" dirty="0">
                 <a:latin typeface="Consolas" panose="020B0609020204030204" pitchFamily="49" charset="0"/>
                 <a:cs typeface="Consolas" panose="020B0609020204030204" pitchFamily="49" charset="0"/>
               </a:rPr>
-              <a:t>/</a:t>
+              <a:t> </a:t>
             </a:r>
             <a:r>
               <a:rPr lang="en-US" altLang="ko-Kore-KR" sz="1800" dirty="0" err="1">

</xml_diff>